<commit_message>
Some changes on ppt
</commit_message>
<xml_diff>
--- a/proj2/iart_proj2_checkpoint.pptx
+++ b/proj2/iart_proj2_checkpoint.pptx
@@ -276,7 +276,7 @@
             </a:pPr>
             <a:fld id="{76969C88-B244-455D-A017-012B25B1ACDD}" type="datetimeFigureOut">
               <a:rPr lang="en-US"/>
-              <a:t>5/28/2022</a:t>
+              <a:t>5/29/2022</a:t>
             </a:fld>
             <a:endParaRPr lang="en-US"/>
           </a:p>
@@ -467,7 +467,7 @@
             </a:pPr>
             <a:fld id="{76969C88-B244-455D-A017-012B25B1ACDD}" type="datetimeFigureOut">
               <a:rPr lang="en-US"/>
-              <a:t>5/28/2022</a:t>
+              <a:t>5/29/2022</a:t>
             </a:fld>
             <a:endParaRPr lang="en-US"/>
           </a:p>
@@ -668,7 +668,7 @@
             </a:pPr>
             <a:fld id="{76969C88-B244-455D-A017-012B25B1ACDD}" type="datetimeFigureOut">
               <a:rPr lang="en-US"/>
-              <a:t>5/28/2022</a:t>
+              <a:t>5/29/2022</a:t>
             </a:fld>
             <a:endParaRPr lang="en-US"/>
           </a:p>
@@ -858,7 +858,7 @@
             </a:pPr>
             <a:fld id="{76969C88-B244-455D-A017-012B25B1ACDD}" type="datetimeFigureOut">
               <a:rPr lang="en-US"/>
-              <a:t>5/28/2022</a:t>
+              <a:t>5/29/2022</a:t>
             </a:fld>
             <a:endParaRPr lang="en-US"/>
           </a:p>
@@ -1114,7 +1114,7 @@
             </a:pPr>
             <a:fld id="{76969C88-B244-455D-A017-012B25B1ACDD}" type="datetimeFigureOut">
               <a:rPr lang="en-US"/>
-              <a:t>5/28/2022</a:t>
+              <a:t>5/29/2022</a:t>
             </a:fld>
             <a:endParaRPr lang="en-US"/>
           </a:p>
@@ -1381,7 +1381,7 @@
             </a:pPr>
             <a:fld id="{76969C88-B244-455D-A017-012B25B1ACDD}" type="datetimeFigureOut">
               <a:rPr lang="en-US"/>
-              <a:t>5/28/2022</a:t>
+              <a:t>5/29/2022</a:t>
             </a:fld>
             <a:endParaRPr lang="en-US"/>
           </a:p>
@@ -1789,7 +1789,7 @@
             </a:pPr>
             <a:fld id="{76969C88-B244-455D-A017-012B25B1ACDD}" type="datetimeFigureOut">
               <a:rPr lang="en-US"/>
-              <a:t>5/28/2022</a:t>
+              <a:t>5/29/2022</a:t>
             </a:fld>
             <a:endParaRPr lang="en-US"/>
           </a:p>
@@ -1914,7 +1914,7 @@
             </a:pPr>
             <a:fld id="{76969C88-B244-455D-A017-012B25B1ACDD}" type="datetimeFigureOut">
               <a:rPr lang="en-US"/>
-              <a:t>5/28/2022</a:t>
+              <a:t>5/29/2022</a:t>
             </a:fld>
             <a:endParaRPr lang="en-US"/>
           </a:p>
@@ -2013,7 +2013,7 @@
             </a:pPr>
             <a:fld id="{76969C88-B244-455D-A017-012B25B1ACDD}" type="datetimeFigureOut">
               <a:rPr lang="en-US"/>
-              <a:t>5/28/2022</a:t>
+              <a:t>5/29/2022</a:t>
             </a:fld>
             <a:endParaRPr lang="en-US"/>
           </a:p>
@@ -2313,7 +2313,7 @@
             </a:pPr>
             <a:fld id="{76969C88-B244-455D-A017-012B25B1ACDD}" type="datetimeFigureOut">
               <a:rPr lang="en-US"/>
-              <a:t>5/28/2022</a:t>
+              <a:t>5/29/2022</a:t>
             </a:fld>
             <a:endParaRPr lang="en-US"/>
           </a:p>
@@ -2583,7 +2583,7 @@
             </a:pPr>
             <a:fld id="{76969C88-B244-455D-A017-012B25B1ACDD}" type="datetimeFigureOut">
               <a:rPr lang="en-US"/>
-              <a:t>5/28/2022</a:t>
+              <a:t>5/29/2022</a:t>
             </a:fld>
             <a:endParaRPr lang="en-US"/>
           </a:p>
@@ -3303,7 +3303,7 @@
             </a:pPr>
             <a:fld id="{76969C88-B244-455D-A017-012B25B1ACDD}" type="datetimeFigureOut">
               <a:rPr lang="en-US"/>
-              <a:t>5/28/2022</a:t>
+              <a:t>5/29/2022</a:t>
             </a:fld>
             <a:endParaRPr lang="en-US"/>
           </a:p>
@@ -4307,7 +4307,7 @@
         </p:spPr>
         <p:txBody>
           <a:bodyPr vert="horz" lIns="91440" tIns="45720" rIns="91440" bIns="45720" rtlCol="0" anchor="t">
-            <a:normAutofit fontScale="92500"/>
+            <a:normAutofit lnSpcReduction="10000"/>
           </a:bodyPr>
           <a:lstStyle/>
           <a:p>
@@ -4347,7 +4347,7 @@
                   </a:srgbClr>
                 </a:solidFill>
               </a:rPr>
-              <a:t>So, given a dataset with information about telco customers we want to predict if a customer will churn or not</a:t>
+              <a:t>So, given a dataset with information about telco customers we want to predict if a customer will churn or not.</a:t>
             </a:r>
           </a:p>
           <a:p>
@@ -4359,7 +4359,7 @@
                   </a:srgbClr>
                 </a:solidFill>
               </a:rPr>
-              <a:t>In other words we want to, the main goal of this project is to predict if a customer will stop buying products/services in telco.</a:t>
+              <a:t>In other words the main goal of this project is to predict if a customer will stop buying products/services in telco.</a:t>
             </a:r>
           </a:p>
         </p:txBody>
@@ -4476,7 +4476,7 @@
               <a:t>course</a:t>
             </a:r>
             <a:r>
-              <a:rPr lang="pt-PT">
+              <a:rPr lang="pt-PT" dirty="0">
                 <a:ea typeface="+mn-lt"/>
                 <a:cs typeface="+mn-lt"/>
               </a:rPr>
@@ -4491,6 +4491,25 @@
                 <a:hlinkClick r:id="rId3"/>
               </a:rPr>
               <a:t>https://www.kaggle.com/datasets/easonlai/sample-telco-customer-churn-dataset</a:t>
+            </a:r>
+            <a:endParaRPr lang="pt-PT" dirty="0">
+              <a:ea typeface="+mn-lt"/>
+              <a:cs typeface="+mn-lt"/>
+            </a:endParaRPr>
+          </a:p>
+          <a:p>
+            <a:r>
+              <a:rPr lang="pt-PT" dirty="0">
+                <a:solidFill>
+                  <a:srgbClr val="FFFFFF">
+                    <a:alpha val="70000"/>
+                  </a:srgbClr>
+                </a:solidFill>
+                <a:ea typeface="+mn-lt"/>
+                <a:cs typeface="Arial"/>
+                <a:hlinkClick r:id="rId4"/>
+              </a:rPr>
+              <a:t>https://www.kaggle.com/datasets/blastchar/telco-customer-churn</a:t>
             </a:r>
             <a:endParaRPr lang="pt-PT" dirty="0">
               <a:solidFill>

</xml_diff>

<commit_message>
Fix specification in notebook and ppt
</commit_message>
<xml_diff>
--- a/proj2/iart_proj2_checkpoint.pptx
+++ b/proj2/iart_proj2_checkpoint.pptx
@@ -1,15 +1,15 @@
 
 <file path=ppt/presentation.xml><?xml version="1.0" encoding="utf-8"?>
-<p:presentation xmlns:a="http://schemas.openxmlformats.org/drawingml/2006/main" xmlns:r="http://schemas.openxmlformats.org/officeDocument/2006/relationships" xmlns:p="http://schemas.openxmlformats.org/presentationml/2006/main" saveSubsetFonts="1">
+<p:presentation xmlns:a="http://schemas.openxmlformats.org/drawingml/2006/main" xmlns:r="http://schemas.openxmlformats.org/officeDocument/2006/relationships" xmlns:p="http://schemas.openxmlformats.org/presentationml/2006/main" xmlns:m="http://schemas.openxmlformats.org/officeDocument/2006/math" xmlns:w="http://schemas.openxmlformats.org/wordprocessingml/2006/main" saveSubsetFonts="1">
   <p:sldMasterIdLst>
     <p:sldMasterId id="2147483648" r:id="rId1"/>
   </p:sldMasterIdLst>
   <p:sldIdLst>
-    <p:sldId id="256" r:id="rId2"/>
-    <p:sldId id="257" r:id="rId3"/>
-    <p:sldId id="258" r:id="rId4"/>
-    <p:sldId id="259" r:id="rId5"/>
-    <p:sldId id="260" r:id="rId6"/>
+    <p:sldId id="256" r:id="rId3"/>
+    <p:sldId id="257" r:id="rId4"/>
+    <p:sldId id="258" r:id="rId5"/>
+    <p:sldId id="259" r:id="rId6"/>
+    <p:sldId id="260" r:id="rId7"/>
   </p:sldIdLst>
   <p:sldSz cx="12192000" cy="6858000"/>
   <p:notesSz cx="12192000" cy="6858000"/>
@@ -108,42 +108,17 @@
       </a:defRPr>
     </a:lvl9pPr>
   </p:defaultTextStyle>
-  <p:extLst>
-    <p:ext uri="{EFAFB233-063F-42B5-8137-9DF3F51BA10A}">
-      <p15:sldGuideLst xmlns:p15="http://schemas.microsoft.com/office/powerpoint/2012/main">
-        <p15:guide id="1" orient="horz" pos="2160">
-          <p15:clr>
-            <a:srgbClr val="A4A3A4"/>
-          </p15:clr>
-        </p15:guide>
-        <p15:guide id="2" pos="2880">
-          <p15:clr>
-            <a:srgbClr val="A4A3A4"/>
-          </p15:clr>
-        </p15:guide>
-      </p15:sldGuideLst>
-    </p:ext>
-  </p:extLst>
 </p:presentation>
 </file>
 
-<file path=ppt/revisionInfo.xml><?xml version="1.0" encoding="utf-8"?>
-<p1510:revInfo xmlns:a="http://schemas.openxmlformats.org/drawingml/2006/main" xmlns:r="http://schemas.openxmlformats.org/officeDocument/2006/relationships" xmlns:p1510="http://schemas.microsoft.com/office/powerpoint/2015/10/main">
-  <p1510:revLst>
-    <p1510:client id="{0DCF6D82-A78A-42A3-8F89-C15D4BE23402}" v="322" dt="2022-05-28T20:11:10.107"/>
-    <p1510:client id="{7B16D6FE-AA98-4073-9FBA-BDAA968F85D1}" v="246" dt="2022-05-28T22:12:29.088"/>
-  </p1510:revLst>
-</p1510:revInfo>
-</file>
-
 <file path=ppt/slideLayouts/slideLayout1.xml><?xml version="1.0" encoding="utf-8"?>
-<p:sldLayout xmlns:a="http://schemas.openxmlformats.org/drawingml/2006/main" xmlns:r="http://schemas.openxmlformats.org/officeDocument/2006/relationships" xmlns:p="http://schemas.openxmlformats.org/presentationml/2006/main" showMasterPhAnim="0" type="title" preserve="1" userDrawn="1">
+<p:sldLayout xmlns:a="http://schemas.openxmlformats.org/drawingml/2006/main" xmlns:r="http://schemas.openxmlformats.org/officeDocument/2006/relationships" xmlns:p="http://schemas.openxmlformats.org/presentationml/2006/main" xmlns:m="http://schemas.openxmlformats.org/officeDocument/2006/math" xmlns:w="http://schemas.openxmlformats.org/wordprocessingml/2006/main" matchingName="" preserve="1" showMasterPhAnim="0" type="title" userDrawn="1">
   <p:cSld name="Title Slide">
     <p:spTree>
       <p:nvGrpSpPr>
-        <p:cNvPr id="1" name=""/>
+        <p:cNvPr id="1" name="" hidden="0"/>
         <p:cNvGrpSpPr/>
-        <p:nvPr/>
+        <p:nvPr isPhoto="0" userDrawn="0"/>
       </p:nvGrpSpPr>
       <p:grpSpPr bwMode="auto">
         <a:xfrm>
@@ -155,12 +130,12 @@
       </p:grpSpPr>
       <p:sp>
         <p:nvSpPr>
-          <p:cNvPr id="2" name="Title 1"/>
-          <p:cNvSpPr>
-            <a:spLocks noGrp="1"/>
-          </p:cNvSpPr>
-          <p:nvPr>
-            <p:ph type="ctrTitle"/>
+          <p:cNvPr id="2" name="Title 1" hidden="0"/>
+          <p:cNvSpPr>
+            <a:spLocks noGrp="1"/>
+          </p:cNvSpPr>
+          <p:nvPr isPhoto="0" userDrawn="0">
+            <p:ph type="ctrTitle" hasCustomPrompt="0"/>
           </p:nvPr>
         </p:nvSpPr>
         <p:spPr bwMode="auto">
@@ -190,12 +165,12 @@
       </p:sp>
       <p:sp>
         <p:nvSpPr>
-          <p:cNvPr id="3" name="Subtitle 2"/>
-          <p:cNvSpPr>
-            <a:spLocks noGrp="1"/>
-          </p:cNvSpPr>
-          <p:nvPr>
-            <p:ph type="subTitle" idx="1"/>
+          <p:cNvPr id="3" name="Subtitle 2" hidden="0"/>
+          <p:cNvSpPr>
+            <a:spLocks noGrp="1"/>
+          </p:cNvSpPr>
+          <p:nvPr isPhoto="0" userDrawn="0">
+            <p:ph type="subTitle" idx="1" hasCustomPrompt="0"/>
           </p:nvPr>
         </p:nvSpPr>
         <p:spPr bwMode="auto">
@@ -258,12 +233,12 @@
       </p:sp>
       <p:sp>
         <p:nvSpPr>
-          <p:cNvPr id="4" name="Date Placeholder 3"/>
-          <p:cNvSpPr>
-            <a:spLocks noGrp="1"/>
-          </p:cNvSpPr>
-          <p:nvPr>
-            <p:ph type="dt" sz="half" idx="10"/>
+          <p:cNvPr id="4" name="Date Placeholder 3" hidden="0"/>
+          <p:cNvSpPr>
+            <a:spLocks noGrp="1"/>
+          </p:cNvSpPr>
+          <p:nvPr isPhoto="0" userDrawn="0">
+            <p:ph type="dt" sz="half" idx="10" hasCustomPrompt="0"/>
           </p:nvPr>
         </p:nvSpPr>
         <p:spPr bwMode="auto"/>
@@ -276,7 +251,7 @@
             </a:pPr>
             <a:fld id="{76969C88-B244-455D-A017-012B25B1ACDD}" type="datetimeFigureOut">
               <a:rPr lang="en-US"/>
-              <a:t>5/29/2022</a:t>
+              <a:t/>
             </a:fld>
             <a:endParaRPr lang="en-US"/>
           </a:p>
@@ -284,12 +259,12 @@
       </p:sp>
       <p:sp>
         <p:nvSpPr>
-          <p:cNvPr id="5" name="Footer Placeholder 4"/>
-          <p:cNvSpPr>
-            <a:spLocks noGrp="1"/>
-          </p:cNvSpPr>
-          <p:nvPr>
-            <p:ph type="ftr" sz="quarter" idx="11"/>
+          <p:cNvPr id="5" name="Footer Placeholder 4" hidden="0"/>
+          <p:cNvSpPr>
+            <a:spLocks noGrp="1"/>
+          </p:cNvSpPr>
+          <p:nvPr isPhoto="0" userDrawn="0">
+            <p:ph type="ftr" sz="quarter" idx="11" hasCustomPrompt="0"/>
           </p:nvPr>
         </p:nvSpPr>
         <p:spPr bwMode="auto"/>
@@ -306,12 +281,12 @@
       </p:sp>
       <p:sp>
         <p:nvSpPr>
-          <p:cNvPr id="6" name="Slide Number Placeholder 5"/>
-          <p:cNvSpPr>
-            <a:spLocks noGrp="1"/>
-          </p:cNvSpPr>
-          <p:nvPr>
-            <p:ph type="sldNum" sz="quarter" idx="12"/>
+          <p:cNvPr id="6" name="Slide Number Placeholder 5" hidden="0"/>
+          <p:cNvSpPr>
+            <a:spLocks noGrp="1"/>
+          </p:cNvSpPr>
+          <p:nvPr isPhoto="0" userDrawn="0">
+            <p:ph type="sldNum" sz="quarter" idx="12" hasCustomPrompt="0"/>
           </p:nvPr>
         </p:nvSpPr>
         <p:spPr bwMode="auto"/>
@@ -324,7 +299,7 @@
             </a:pPr>
             <a:fld id="{07CE569E-9B7C-4CB9-AB80-C0841F922CFF}" type="slidenum">
               <a:rPr lang="en-US"/>
-              <a:t>‹nº›</a:t>
+              <a:t/>
             </a:fld>
             <a:endParaRPr lang="en-US"/>
           </a:p>
@@ -339,13 +314,13 @@
 </file>
 
 <file path=ppt/slideLayouts/slideLayout10.xml><?xml version="1.0" encoding="utf-8"?>
-<p:sldLayout xmlns:a="http://schemas.openxmlformats.org/drawingml/2006/main" xmlns:r="http://schemas.openxmlformats.org/officeDocument/2006/relationships" xmlns:p="http://schemas.openxmlformats.org/presentationml/2006/main" showMasterPhAnim="0" type="vertTx" preserve="1" userDrawn="1">
+<p:sldLayout xmlns:a="http://schemas.openxmlformats.org/drawingml/2006/main" xmlns:r="http://schemas.openxmlformats.org/officeDocument/2006/relationships" xmlns:p="http://schemas.openxmlformats.org/presentationml/2006/main" xmlns:m="http://schemas.openxmlformats.org/officeDocument/2006/math" xmlns:w="http://schemas.openxmlformats.org/wordprocessingml/2006/main" matchingName="" preserve="1" showMasterPhAnim="0" type="vertTx" userDrawn="1">
   <p:cSld name="Title and Vertical Text">
     <p:spTree>
       <p:nvGrpSpPr>
-        <p:cNvPr id="1" name=""/>
+        <p:cNvPr id="1" name="" hidden="0"/>
         <p:cNvGrpSpPr/>
-        <p:nvPr/>
+        <p:nvPr isPhoto="0" userDrawn="0"/>
       </p:nvGrpSpPr>
       <p:grpSpPr bwMode="auto">
         <a:xfrm>
@@ -357,12 +332,12 @@
       </p:grpSpPr>
       <p:sp>
         <p:nvSpPr>
-          <p:cNvPr id="2" name="Title 1"/>
-          <p:cNvSpPr>
-            <a:spLocks noGrp="1"/>
-          </p:cNvSpPr>
-          <p:nvPr>
-            <p:ph type="title"/>
+          <p:cNvPr id="2" name="Title 1" hidden="0"/>
+          <p:cNvSpPr>
+            <a:spLocks noGrp="1"/>
+          </p:cNvSpPr>
+          <p:nvPr isPhoto="0" userDrawn="0">
+            <p:ph type="title" hasCustomPrompt="0"/>
           </p:nvPr>
         </p:nvSpPr>
         <p:spPr bwMode="auto"/>
@@ -383,12 +358,12 @@
       </p:sp>
       <p:sp>
         <p:nvSpPr>
-          <p:cNvPr id="3" name="Vertical Text Placeholder 2"/>
-          <p:cNvSpPr>
-            <a:spLocks noGrp="1"/>
-          </p:cNvSpPr>
-          <p:nvPr>
-            <p:ph type="body" orient="vert" idx="1"/>
+          <p:cNvPr id="3" name="Vertical Text Placeholder 2" hidden="0"/>
+          <p:cNvSpPr>
+            <a:spLocks noGrp="1"/>
+          </p:cNvSpPr>
+          <p:nvPr isPhoto="0" userDrawn="0">
+            <p:ph type="body" orient="vert" idx="1" hasCustomPrompt="0"/>
           </p:nvPr>
         </p:nvSpPr>
         <p:spPr bwMode="auto"/>
@@ -449,12 +424,12 @@
       </p:sp>
       <p:sp>
         <p:nvSpPr>
-          <p:cNvPr id="4" name="Date Placeholder 3"/>
-          <p:cNvSpPr>
-            <a:spLocks noGrp="1"/>
-          </p:cNvSpPr>
-          <p:nvPr>
-            <p:ph type="dt" sz="half" idx="10"/>
+          <p:cNvPr id="4" name="Date Placeholder 3" hidden="0"/>
+          <p:cNvSpPr>
+            <a:spLocks noGrp="1"/>
+          </p:cNvSpPr>
+          <p:nvPr isPhoto="0" userDrawn="0">
+            <p:ph type="dt" sz="half" idx="10" hasCustomPrompt="0"/>
           </p:nvPr>
         </p:nvSpPr>
         <p:spPr bwMode="auto"/>
@@ -467,7 +442,7 @@
             </a:pPr>
             <a:fld id="{76969C88-B244-455D-A017-012B25B1ACDD}" type="datetimeFigureOut">
               <a:rPr lang="en-US"/>
-              <a:t>5/29/2022</a:t>
+              <a:t/>
             </a:fld>
             <a:endParaRPr lang="en-US"/>
           </a:p>
@@ -475,12 +450,12 @@
       </p:sp>
       <p:sp>
         <p:nvSpPr>
-          <p:cNvPr id="5" name="Footer Placeholder 4"/>
-          <p:cNvSpPr>
-            <a:spLocks noGrp="1"/>
-          </p:cNvSpPr>
-          <p:nvPr>
-            <p:ph type="ftr" sz="quarter" idx="11"/>
+          <p:cNvPr id="5" name="Footer Placeholder 4" hidden="0"/>
+          <p:cNvSpPr>
+            <a:spLocks noGrp="1"/>
+          </p:cNvSpPr>
+          <p:nvPr isPhoto="0" userDrawn="0">
+            <p:ph type="ftr" sz="quarter" idx="11" hasCustomPrompt="0"/>
           </p:nvPr>
         </p:nvSpPr>
         <p:spPr bwMode="auto"/>
@@ -497,12 +472,12 @@
       </p:sp>
       <p:sp>
         <p:nvSpPr>
-          <p:cNvPr id="6" name="Slide Number Placeholder 5"/>
-          <p:cNvSpPr>
-            <a:spLocks noGrp="1"/>
-          </p:cNvSpPr>
-          <p:nvPr>
-            <p:ph type="sldNum" sz="quarter" idx="12"/>
+          <p:cNvPr id="6" name="Slide Number Placeholder 5" hidden="0"/>
+          <p:cNvSpPr>
+            <a:spLocks noGrp="1"/>
+          </p:cNvSpPr>
+          <p:nvPr isPhoto="0" userDrawn="0">
+            <p:ph type="sldNum" sz="quarter" idx="12" hasCustomPrompt="0"/>
           </p:nvPr>
         </p:nvSpPr>
         <p:spPr bwMode="auto"/>
@@ -515,7 +490,7 @@
             </a:pPr>
             <a:fld id="{07CE569E-9B7C-4CB9-AB80-C0841F922CFF}" type="slidenum">
               <a:rPr lang="en-US"/>
-              <a:t>‹nº›</a:t>
+              <a:t/>
             </a:fld>
             <a:endParaRPr lang="en-US"/>
           </a:p>
@@ -530,13 +505,13 @@
 </file>
 
 <file path=ppt/slideLayouts/slideLayout11.xml><?xml version="1.0" encoding="utf-8"?>
-<p:sldLayout xmlns:a="http://schemas.openxmlformats.org/drawingml/2006/main" xmlns:r="http://schemas.openxmlformats.org/officeDocument/2006/relationships" xmlns:p="http://schemas.openxmlformats.org/presentationml/2006/main" showMasterPhAnim="0" type="vertTitleAndTx" preserve="1" userDrawn="1">
+<p:sldLayout xmlns:a="http://schemas.openxmlformats.org/drawingml/2006/main" xmlns:r="http://schemas.openxmlformats.org/officeDocument/2006/relationships" xmlns:p="http://schemas.openxmlformats.org/presentationml/2006/main" xmlns:m="http://schemas.openxmlformats.org/officeDocument/2006/math" xmlns:w="http://schemas.openxmlformats.org/wordprocessingml/2006/main" matchingName="" preserve="1" showMasterPhAnim="0" type="vertTitleAndTx" userDrawn="1">
   <p:cSld name="Vertical Title and Text">
     <p:spTree>
       <p:nvGrpSpPr>
-        <p:cNvPr id="1" name=""/>
+        <p:cNvPr id="1" name="" hidden="0"/>
         <p:cNvGrpSpPr/>
-        <p:nvPr/>
+        <p:nvPr isPhoto="0" userDrawn="0"/>
       </p:nvGrpSpPr>
       <p:grpSpPr bwMode="auto">
         <a:xfrm>
@@ -548,12 +523,12 @@
       </p:grpSpPr>
       <p:sp>
         <p:nvSpPr>
-          <p:cNvPr id="2" name="Vertical Title 1"/>
-          <p:cNvSpPr>
-            <a:spLocks noGrp="1"/>
-          </p:cNvSpPr>
-          <p:nvPr>
-            <p:ph type="title" orient="vert"/>
+          <p:cNvPr id="2" name="Vertical Title 1" hidden="0"/>
+          <p:cNvSpPr>
+            <a:spLocks noGrp="1"/>
+          </p:cNvSpPr>
+          <p:nvPr isPhoto="0" userDrawn="0">
+            <p:ph type="title" orient="vert" hasCustomPrompt="0"/>
           </p:nvPr>
         </p:nvSpPr>
         <p:spPr bwMode="auto">
@@ -579,12 +554,12 @@
       </p:sp>
       <p:sp>
         <p:nvSpPr>
-          <p:cNvPr id="3" name="Vertical Text Placeholder 2"/>
-          <p:cNvSpPr>
-            <a:spLocks noGrp="1"/>
-          </p:cNvSpPr>
-          <p:nvPr>
-            <p:ph type="body" orient="vert" idx="1"/>
+          <p:cNvPr id="3" name="Vertical Text Placeholder 2" hidden="0"/>
+          <p:cNvSpPr>
+            <a:spLocks noGrp="1"/>
+          </p:cNvSpPr>
+          <p:nvPr isPhoto="0" userDrawn="0">
+            <p:ph type="body" orient="vert" idx="1" hasCustomPrompt="0"/>
           </p:nvPr>
         </p:nvSpPr>
         <p:spPr bwMode="auto">
@@ -650,12 +625,12 @@
       </p:sp>
       <p:sp>
         <p:nvSpPr>
-          <p:cNvPr id="4" name="Date Placeholder 3"/>
-          <p:cNvSpPr>
-            <a:spLocks noGrp="1"/>
-          </p:cNvSpPr>
-          <p:nvPr>
-            <p:ph type="dt" sz="half" idx="10"/>
+          <p:cNvPr id="4" name="Date Placeholder 3" hidden="0"/>
+          <p:cNvSpPr>
+            <a:spLocks noGrp="1"/>
+          </p:cNvSpPr>
+          <p:nvPr isPhoto="0" userDrawn="0">
+            <p:ph type="dt" sz="half" idx="10" hasCustomPrompt="0"/>
           </p:nvPr>
         </p:nvSpPr>
         <p:spPr bwMode="auto"/>
@@ -668,7 +643,7 @@
             </a:pPr>
             <a:fld id="{76969C88-B244-455D-A017-012B25B1ACDD}" type="datetimeFigureOut">
               <a:rPr lang="en-US"/>
-              <a:t>5/29/2022</a:t>
+              <a:t/>
             </a:fld>
             <a:endParaRPr lang="en-US"/>
           </a:p>
@@ -676,12 +651,12 @@
       </p:sp>
       <p:sp>
         <p:nvSpPr>
-          <p:cNvPr id="5" name="Footer Placeholder 4"/>
-          <p:cNvSpPr>
-            <a:spLocks noGrp="1"/>
-          </p:cNvSpPr>
-          <p:nvPr>
-            <p:ph type="ftr" sz="quarter" idx="11"/>
+          <p:cNvPr id="5" name="Footer Placeholder 4" hidden="0"/>
+          <p:cNvSpPr>
+            <a:spLocks noGrp="1"/>
+          </p:cNvSpPr>
+          <p:nvPr isPhoto="0" userDrawn="0">
+            <p:ph type="ftr" sz="quarter" idx="11" hasCustomPrompt="0"/>
           </p:nvPr>
         </p:nvSpPr>
         <p:spPr bwMode="auto"/>
@@ -698,12 +673,12 @@
       </p:sp>
       <p:sp>
         <p:nvSpPr>
-          <p:cNvPr id="6" name="Slide Number Placeholder 5"/>
-          <p:cNvSpPr>
-            <a:spLocks noGrp="1"/>
-          </p:cNvSpPr>
-          <p:nvPr>
-            <p:ph type="sldNum" sz="quarter" idx="12"/>
+          <p:cNvPr id="6" name="Slide Number Placeholder 5" hidden="0"/>
+          <p:cNvSpPr>
+            <a:spLocks noGrp="1"/>
+          </p:cNvSpPr>
+          <p:nvPr isPhoto="0" userDrawn="0">
+            <p:ph type="sldNum" sz="quarter" idx="12" hasCustomPrompt="0"/>
           </p:nvPr>
         </p:nvSpPr>
         <p:spPr bwMode="auto"/>
@@ -716,7 +691,7 @@
             </a:pPr>
             <a:fld id="{07CE569E-9B7C-4CB9-AB80-C0841F922CFF}" type="slidenum">
               <a:rPr lang="en-US"/>
-              <a:t>‹nº›</a:t>
+              <a:t/>
             </a:fld>
             <a:endParaRPr lang="en-US"/>
           </a:p>
@@ -731,13 +706,13 @@
 </file>
 
 <file path=ppt/slideLayouts/slideLayout2.xml><?xml version="1.0" encoding="utf-8"?>
-<p:sldLayout xmlns:a="http://schemas.openxmlformats.org/drawingml/2006/main" xmlns:r="http://schemas.openxmlformats.org/officeDocument/2006/relationships" xmlns:p="http://schemas.openxmlformats.org/presentationml/2006/main" showMasterPhAnim="0" type="obj" preserve="1" userDrawn="1">
+<p:sldLayout xmlns:a="http://schemas.openxmlformats.org/drawingml/2006/main" xmlns:r="http://schemas.openxmlformats.org/officeDocument/2006/relationships" xmlns:p="http://schemas.openxmlformats.org/presentationml/2006/main" xmlns:m="http://schemas.openxmlformats.org/officeDocument/2006/math" xmlns:w="http://schemas.openxmlformats.org/wordprocessingml/2006/main" matchingName="" preserve="1" showMasterPhAnim="0" type="obj" userDrawn="1">
   <p:cSld name="Title and Content">
     <p:spTree>
       <p:nvGrpSpPr>
-        <p:cNvPr id="1" name=""/>
+        <p:cNvPr id="1" name="" hidden="0"/>
         <p:cNvGrpSpPr/>
-        <p:nvPr/>
+        <p:nvPr isPhoto="0" userDrawn="0"/>
       </p:nvGrpSpPr>
       <p:grpSpPr bwMode="auto">
         <a:xfrm>
@@ -749,12 +724,12 @@
       </p:grpSpPr>
       <p:sp>
         <p:nvSpPr>
-          <p:cNvPr id="2" name="Title 1"/>
-          <p:cNvSpPr>
-            <a:spLocks noGrp="1"/>
-          </p:cNvSpPr>
-          <p:nvPr>
-            <p:ph type="title"/>
+          <p:cNvPr id="2" name="Title 1" hidden="0"/>
+          <p:cNvSpPr>
+            <a:spLocks noGrp="1"/>
+          </p:cNvSpPr>
+          <p:nvPr isPhoto="0" userDrawn="0">
+            <p:ph type="title" hasCustomPrompt="0"/>
           </p:nvPr>
         </p:nvSpPr>
         <p:spPr bwMode="auto"/>
@@ -769,17 +744,18 @@
               <a:rPr lang="en-US"/>
               <a:t>Click to edit Master title style</a:t>
             </a:r>
-          </a:p>
-        </p:txBody>
-      </p:sp>
-      <p:sp>
-        <p:nvSpPr>
-          <p:cNvPr id="3" name="Content Placeholder 2"/>
-          <p:cNvSpPr>
-            <a:spLocks noGrp="1"/>
-          </p:cNvSpPr>
-          <p:nvPr>
-            <p:ph idx="1"/>
+            <a:endParaRPr/>
+          </a:p>
+        </p:txBody>
+      </p:sp>
+      <p:sp>
+        <p:nvSpPr>
+          <p:cNvPr id="3" name="Content Placeholder 2" hidden="0"/>
+          <p:cNvSpPr>
+            <a:spLocks noGrp="1"/>
+          </p:cNvSpPr>
+          <p:nvPr isPhoto="0" userDrawn="0">
+            <p:ph idx="1" hasCustomPrompt="0"/>
           </p:nvPr>
         </p:nvSpPr>
         <p:spPr bwMode="auto"/>
@@ -840,12 +816,12 @@
       </p:sp>
       <p:sp>
         <p:nvSpPr>
-          <p:cNvPr id="4" name="Date Placeholder 3"/>
-          <p:cNvSpPr>
-            <a:spLocks noGrp="1"/>
-          </p:cNvSpPr>
-          <p:nvPr>
-            <p:ph type="dt" sz="half" idx="10"/>
+          <p:cNvPr id="4" name="Date Placeholder 3" hidden="0"/>
+          <p:cNvSpPr>
+            <a:spLocks noGrp="1"/>
+          </p:cNvSpPr>
+          <p:nvPr isPhoto="0" userDrawn="0">
+            <p:ph type="dt" sz="half" idx="10" hasCustomPrompt="0"/>
           </p:nvPr>
         </p:nvSpPr>
         <p:spPr bwMode="auto"/>
@@ -858,7 +834,7 @@
             </a:pPr>
             <a:fld id="{76969C88-B244-455D-A017-012B25B1ACDD}" type="datetimeFigureOut">
               <a:rPr lang="en-US"/>
-              <a:t>5/29/2022</a:t>
+              <a:t/>
             </a:fld>
             <a:endParaRPr lang="en-US"/>
           </a:p>
@@ -866,12 +842,12 @@
       </p:sp>
       <p:sp>
         <p:nvSpPr>
-          <p:cNvPr id="5" name="Footer Placeholder 4"/>
-          <p:cNvSpPr>
-            <a:spLocks noGrp="1"/>
-          </p:cNvSpPr>
-          <p:nvPr>
-            <p:ph type="ftr" sz="quarter" idx="11"/>
+          <p:cNvPr id="5" name="Footer Placeholder 4" hidden="0"/>
+          <p:cNvSpPr>
+            <a:spLocks noGrp="1"/>
+          </p:cNvSpPr>
+          <p:nvPr isPhoto="0" userDrawn="0">
+            <p:ph type="ftr" sz="quarter" idx="11" hasCustomPrompt="0"/>
           </p:nvPr>
         </p:nvSpPr>
         <p:spPr bwMode="auto"/>
@@ -888,12 +864,12 @@
       </p:sp>
       <p:sp>
         <p:nvSpPr>
-          <p:cNvPr id="6" name="Slide Number Placeholder 5"/>
-          <p:cNvSpPr>
-            <a:spLocks noGrp="1"/>
-          </p:cNvSpPr>
-          <p:nvPr>
-            <p:ph type="sldNum" sz="quarter" idx="12"/>
+          <p:cNvPr id="6" name="Slide Number Placeholder 5" hidden="0"/>
+          <p:cNvSpPr>
+            <a:spLocks noGrp="1"/>
+          </p:cNvSpPr>
+          <p:nvPr isPhoto="0" userDrawn="0">
+            <p:ph type="sldNum" sz="quarter" idx="12" hasCustomPrompt="0"/>
           </p:nvPr>
         </p:nvSpPr>
         <p:spPr bwMode="auto"/>
@@ -906,7 +882,7 @@
             </a:pPr>
             <a:fld id="{07CE569E-9B7C-4CB9-AB80-C0841F922CFF}" type="slidenum">
               <a:rPr lang="en-US"/>
-              <a:t>‹nº›</a:t>
+              <a:t/>
             </a:fld>
             <a:endParaRPr lang="en-US"/>
           </a:p>
@@ -921,13 +897,13 @@
 </file>
 
 <file path=ppt/slideLayouts/slideLayout3.xml><?xml version="1.0" encoding="utf-8"?>
-<p:sldLayout xmlns:a="http://schemas.openxmlformats.org/drawingml/2006/main" xmlns:r="http://schemas.openxmlformats.org/officeDocument/2006/relationships" xmlns:p="http://schemas.openxmlformats.org/presentationml/2006/main" showMasterPhAnim="0" type="secHead" preserve="1" userDrawn="1">
+<p:sldLayout xmlns:a="http://schemas.openxmlformats.org/drawingml/2006/main" xmlns:r="http://schemas.openxmlformats.org/officeDocument/2006/relationships" xmlns:p="http://schemas.openxmlformats.org/presentationml/2006/main" xmlns:m="http://schemas.openxmlformats.org/officeDocument/2006/math" xmlns:w="http://schemas.openxmlformats.org/wordprocessingml/2006/main" matchingName="" preserve="1" showMasterPhAnim="0" type="secHead" userDrawn="1">
   <p:cSld name="Section Header">
     <p:spTree>
       <p:nvGrpSpPr>
-        <p:cNvPr id="1" name=""/>
+        <p:cNvPr id="1" name="" hidden="0"/>
         <p:cNvGrpSpPr/>
-        <p:nvPr/>
+        <p:nvPr isPhoto="0" userDrawn="0"/>
       </p:nvGrpSpPr>
       <p:grpSpPr bwMode="auto">
         <a:xfrm>
@@ -939,12 +915,12 @@
       </p:grpSpPr>
       <p:sp>
         <p:nvSpPr>
-          <p:cNvPr id="2" name="Title 1"/>
-          <p:cNvSpPr>
-            <a:spLocks noGrp="1"/>
-          </p:cNvSpPr>
-          <p:nvPr>
-            <p:ph type="title"/>
+          <p:cNvPr id="2" name="Title 1" hidden="0"/>
+          <p:cNvSpPr>
+            <a:spLocks noGrp="1"/>
+          </p:cNvSpPr>
+          <p:nvPr isPhoto="0" userDrawn="0">
+            <p:ph type="title" hasCustomPrompt="0"/>
           </p:nvPr>
         </p:nvSpPr>
         <p:spPr bwMode="auto">
@@ -974,12 +950,12 @@
       </p:sp>
       <p:sp>
         <p:nvSpPr>
-          <p:cNvPr id="3" name="Text Placeholder 2"/>
-          <p:cNvSpPr>
-            <a:spLocks noGrp="1"/>
-          </p:cNvSpPr>
-          <p:nvPr>
-            <p:ph type="body" idx="1"/>
+          <p:cNvPr id="3" name="Text Placeholder 2" hidden="0"/>
+          <p:cNvSpPr>
+            <a:spLocks noGrp="1"/>
+          </p:cNvSpPr>
+          <p:nvPr isPhoto="0" userDrawn="0">
+            <p:ph type="body" idx="1" hasCustomPrompt="0"/>
           </p:nvPr>
         </p:nvSpPr>
         <p:spPr bwMode="auto">
@@ -1096,12 +1072,12 @@
       </p:sp>
       <p:sp>
         <p:nvSpPr>
-          <p:cNvPr id="4" name="Date Placeholder 3"/>
-          <p:cNvSpPr>
-            <a:spLocks noGrp="1"/>
-          </p:cNvSpPr>
-          <p:nvPr>
-            <p:ph type="dt" sz="half" idx="10"/>
+          <p:cNvPr id="4" name="Date Placeholder 3" hidden="0"/>
+          <p:cNvSpPr>
+            <a:spLocks noGrp="1"/>
+          </p:cNvSpPr>
+          <p:nvPr isPhoto="0" userDrawn="0">
+            <p:ph type="dt" sz="half" idx="10" hasCustomPrompt="0"/>
           </p:nvPr>
         </p:nvSpPr>
         <p:spPr bwMode="auto"/>
@@ -1114,7 +1090,7 @@
             </a:pPr>
             <a:fld id="{76969C88-B244-455D-A017-012B25B1ACDD}" type="datetimeFigureOut">
               <a:rPr lang="en-US"/>
-              <a:t>5/29/2022</a:t>
+              <a:t/>
             </a:fld>
             <a:endParaRPr lang="en-US"/>
           </a:p>
@@ -1122,12 +1098,12 @@
       </p:sp>
       <p:sp>
         <p:nvSpPr>
-          <p:cNvPr id="5" name="Footer Placeholder 4"/>
-          <p:cNvSpPr>
-            <a:spLocks noGrp="1"/>
-          </p:cNvSpPr>
-          <p:nvPr>
-            <p:ph type="ftr" sz="quarter" idx="11"/>
+          <p:cNvPr id="5" name="Footer Placeholder 4" hidden="0"/>
+          <p:cNvSpPr>
+            <a:spLocks noGrp="1"/>
+          </p:cNvSpPr>
+          <p:nvPr isPhoto="0" userDrawn="0">
+            <p:ph type="ftr" sz="quarter" idx="11" hasCustomPrompt="0"/>
           </p:nvPr>
         </p:nvSpPr>
         <p:spPr bwMode="auto"/>
@@ -1144,12 +1120,12 @@
       </p:sp>
       <p:sp>
         <p:nvSpPr>
-          <p:cNvPr id="6" name="Slide Number Placeholder 5"/>
-          <p:cNvSpPr>
-            <a:spLocks noGrp="1"/>
-          </p:cNvSpPr>
-          <p:nvPr>
-            <p:ph type="sldNum" sz="quarter" idx="12"/>
+          <p:cNvPr id="6" name="Slide Number Placeholder 5" hidden="0"/>
+          <p:cNvSpPr>
+            <a:spLocks noGrp="1"/>
+          </p:cNvSpPr>
+          <p:nvPr isPhoto="0" userDrawn="0">
+            <p:ph type="sldNum" sz="quarter" idx="12" hasCustomPrompt="0"/>
           </p:nvPr>
         </p:nvSpPr>
         <p:spPr bwMode="auto"/>
@@ -1162,7 +1138,7 @@
             </a:pPr>
             <a:fld id="{07CE569E-9B7C-4CB9-AB80-C0841F922CFF}" type="slidenum">
               <a:rPr lang="en-US"/>
-              <a:t>‹nº›</a:t>
+              <a:t/>
             </a:fld>
             <a:endParaRPr lang="en-US"/>
           </a:p>
@@ -1177,13 +1153,13 @@
 </file>
 
 <file path=ppt/slideLayouts/slideLayout4.xml><?xml version="1.0" encoding="utf-8"?>
-<p:sldLayout xmlns:a="http://schemas.openxmlformats.org/drawingml/2006/main" xmlns:r="http://schemas.openxmlformats.org/officeDocument/2006/relationships" xmlns:p="http://schemas.openxmlformats.org/presentationml/2006/main" showMasterPhAnim="0" type="twoObj" preserve="1" userDrawn="1">
+<p:sldLayout xmlns:a="http://schemas.openxmlformats.org/drawingml/2006/main" xmlns:r="http://schemas.openxmlformats.org/officeDocument/2006/relationships" xmlns:p="http://schemas.openxmlformats.org/presentationml/2006/main" xmlns:m="http://schemas.openxmlformats.org/officeDocument/2006/math" xmlns:w="http://schemas.openxmlformats.org/wordprocessingml/2006/main" matchingName="" preserve="1" showMasterPhAnim="0" type="twoObj" userDrawn="1">
   <p:cSld name="Two Content">
     <p:spTree>
       <p:nvGrpSpPr>
-        <p:cNvPr id="1" name=""/>
+        <p:cNvPr id="1" name="" hidden="0"/>
         <p:cNvGrpSpPr/>
-        <p:nvPr/>
+        <p:nvPr isPhoto="0" userDrawn="0"/>
       </p:nvGrpSpPr>
       <p:grpSpPr bwMode="auto">
         <a:xfrm>
@@ -1195,12 +1171,12 @@
       </p:grpSpPr>
       <p:sp>
         <p:nvSpPr>
-          <p:cNvPr id="2" name="Title 1"/>
-          <p:cNvSpPr>
-            <a:spLocks noGrp="1"/>
-          </p:cNvSpPr>
-          <p:nvPr>
-            <p:ph type="title"/>
+          <p:cNvPr id="2" name="Title 1" hidden="0"/>
+          <p:cNvSpPr>
+            <a:spLocks noGrp="1"/>
+          </p:cNvSpPr>
+          <p:nvPr isPhoto="0" userDrawn="0">
+            <p:ph type="title" hasCustomPrompt="0"/>
           </p:nvPr>
         </p:nvSpPr>
         <p:spPr bwMode="auto"/>
@@ -1221,12 +1197,12 @@
       </p:sp>
       <p:sp>
         <p:nvSpPr>
-          <p:cNvPr id="3" name="Content Placeholder 2"/>
-          <p:cNvSpPr>
-            <a:spLocks noGrp="1"/>
-          </p:cNvSpPr>
-          <p:nvPr>
-            <p:ph sz="half" idx="1"/>
+          <p:cNvPr id="3" name="Content Placeholder 2" hidden="0"/>
+          <p:cNvSpPr>
+            <a:spLocks noGrp="1"/>
+          </p:cNvSpPr>
+          <p:nvPr isPhoto="0" userDrawn="0">
+            <p:ph sz="half" idx="1" hasCustomPrompt="0"/>
           </p:nvPr>
         </p:nvSpPr>
         <p:spPr bwMode="auto">
@@ -1292,12 +1268,12 @@
       </p:sp>
       <p:sp>
         <p:nvSpPr>
-          <p:cNvPr id="4" name="Content Placeholder 3"/>
-          <p:cNvSpPr>
-            <a:spLocks noGrp="1"/>
-          </p:cNvSpPr>
-          <p:nvPr>
-            <p:ph sz="half" idx="2"/>
+          <p:cNvPr id="4" name="Content Placeholder 3" hidden="0"/>
+          <p:cNvSpPr>
+            <a:spLocks noGrp="1"/>
+          </p:cNvSpPr>
+          <p:nvPr isPhoto="0" userDrawn="0">
+            <p:ph sz="half" idx="2" hasCustomPrompt="0"/>
           </p:nvPr>
         </p:nvSpPr>
         <p:spPr bwMode="auto">
@@ -1363,12 +1339,12 @@
       </p:sp>
       <p:sp>
         <p:nvSpPr>
-          <p:cNvPr id="5" name="Date Placeholder 4"/>
-          <p:cNvSpPr>
-            <a:spLocks noGrp="1"/>
-          </p:cNvSpPr>
-          <p:nvPr>
-            <p:ph type="dt" sz="half" idx="10"/>
+          <p:cNvPr id="5" name="Date Placeholder 4" hidden="0"/>
+          <p:cNvSpPr>
+            <a:spLocks noGrp="1"/>
+          </p:cNvSpPr>
+          <p:nvPr isPhoto="0" userDrawn="0">
+            <p:ph type="dt" sz="half" idx="10" hasCustomPrompt="0"/>
           </p:nvPr>
         </p:nvSpPr>
         <p:spPr bwMode="auto"/>
@@ -1381,7 +1357,7 @@
             </a:pPr>
             <a:fld id="{76969C88-B244-455D-A017-012B25B1ACDD}" type="datetimeFigureOut">
               <a:rPr lang="en-US"/>
-              <a:t>5/29/2022</a:t>
+              <a:t/>
             </a:fld>
             <a:endParaRPr lang="en-US"/>
           </a:p>
@@ -1389,12 +1365,12 @@
       </p:sp>
       <p:sp>
         <p:nvSpPr>
-          <p:cNvPr id="6" name="Footer Placeholder 5"/>
-          <p:cNvSpPr>
-            <a:spLocks noGrp="1"/>
-          </p:cNvSpPr>
-          <p:nvPr>
-            <p:ph type="ftr" sz="quarter" idx="11"/>
+          <p:cNvPr id="6" name="Footer Placeholder 5" hidden="0"/>
+          <p:cNvSpPr>
+            <a:spLocks noGrp="1"/>
+          </p:cNvSpPr>
+          <p:nvPr isPhoto="0" userDrawn="0">
+            <p:ph type="ftr" sz="quarter" idx="11" hasCustomPrompt="0"/>
           </p:nvPr>
         </p:nvSpPr>
         <p:spPr bwMode="auto"/>
@@ -1411,12 +1387,12 @@
       </p:sp>
       <p:sp>
         <p:nvSpPr>
-          <p:cNvPr id="7" name="Slide Number Placeholder 6"/>
-          <p:cNvSpPr>
-            <a:spLocks noGrp="1"/>
-          </p:cNvSpPr>
-          <p:nvPr>
-            <p:ph type="sldNum" sz="quarter" idx="12"/>
+          <p:cNvPr id="7" name="Slide Number Placeholder 6" hidden="0"/>
+          <p:cNvSpPr>
+            <a:spLocks noGrp="1"/>
+          </p:cNvSpPr>
+          <p:nvPr isPhoto="0" userDrawn="0">
+            <p:ph type="sldNum" sz="quarter" idx="12" hasCustomPrompt="0"/>
           </p:nvPr>
         </p:nvSpPr>
         <p:spPr bwMode="auto"/>
@@ -1429,7 +1405,7 @@
             </a:pPr>
             <a:fld id="{07CE569E-9B7C-4CB9-AB80-C0841F922CFF}" type="slidenum">
               <a:rPr lang="en-US"/>
-              <a:t>‹nº›</a:t>
+              <a:t/>
             </a:fld>
             <a:endParaRPr lang="en-US"/>
           </a:p>
@@ -1444,13 +1420,13 @@
 </file>
 
 <file path=ppt/slideLayouts/slideLayout5.xml><?xml version="1.0" encoding="utf-8"?>
-<p:sldLayout xmlns:a="http://schemas.openxmlformats.org/drawingml/2006/main" xmlns:r="http://schemas.openxmlformats.org/officeDocument/2006/relationships" xmlns:p="http://schemas.openxmlformats.org/presentationml/2006/main" showMasterPhAnim="0" preserve="1" userDrawn="1">
+<p:sldLayout xmlns:a="http://schemas.openxmlformats.org/drawingml/2006/main" xmlns:r="http://schemas.openxmlformats.org/officeDocument/2006/relationships" xmlns:p="http://schemas.openxmlformats.org/presentationml/2006/main" xmlns:m="http://schemas.openxmlformats.org/officeDocument/2006/math" xmlns:w="http://schemas.openxmlformats.org/wordprocessingml/2006/main" matchingName="" preserve="1" showMasterPhAnim="0" userDrawn="1">
   <p:cSld name="Comparison">
     <p:spTree>
       <p:nvGrpSpPr>
-        <p:cNvPr id="1" name=""/>
+        <p:cNvPr id="1" name="" hidden="0"/>
         <p:cNvGrpSpPr/>
-        <p:nvPr/>
+        <p:nvPr isPhoto="0" userDrawn="0"/>
       </p:nvGrpSpPr>
       <p:grpSpPr bwMode="auto">
         <a:xfrm>
@@ -1462,12 +1438,12 @@
       </p:grpSpPr>
       <p:sp>
         <p:nvSpPr>
-          <p:cNvPr id="2" name="Title 1"/>
-          <p:cNvSpPr>
-            <a:spLocks noGrp="1"/>
-          </p:cNvSpPr>
-          <p:nvPr>
-            <p:ph type="title"/>
+          <p:cNvPr id="2" name="Title 1" hidden="0"/>
+          <p:cNvSpPr>
+            <a:spLocks noGrp="1"/>
+          </p:cNvSpPr>
+          <p:nvPr isPhoto="0" userDrawn="0">
+            <p:ph type="title" hasCustomPrompt="0"/>
           </p:nvPr>
         </p:nvSpPr>
         <p:spPr bwMode="auto">
@@ -1493,12 +1469,12 @@
       </p:sp>
       <p:sp>
         <p:nvSpPr>
-          <p:cNvPr id="3" name="Text Placeholder 2"/>
-          <p:cNvSpPr>
-            <a:spLocks noGrp="1"/>
-          </p:cNvSpPr>
-          <p:nvPr>
-            <p:ph type="body" idx="1"/>
+          <p:cNvPr id="3" name="Text Placeholder 2" hidden="0"/>
+          <p:cNvSpPr>
+            <a:spLocks noGrp="1"/>
+          </p:cNvSpPr>
+          <p:nvPr isPhoto="0" userDrawn="0">
+            <p:ph type="body" idx="1" hasCustomPrompt="0"/>
           </p:nvPr>
         </p:nvSpPr>
         <p:spPr bwMode="auto">
@@ -1561,12 +1537,12 @@
       </p:sp>
       <p:sp>
         <p:nvSpPr>
-          <p:cNvPr id="4" name="Content Placeholder 3"/>
-          <p:cNvSpPr>
-            <a:spLocks noGrp="1"/>
-          </p:cNvSpPr>
-          <p:nvPr>
-            <p:ph sz="half" idx="2"/>
+          <p:cNvPr id="4" name="Content Placeholder 3" hidden="0"/>
+          <p:cNvSpPr>
+            <a:spLocks noGrp="1"/>
+          </p:cNvSpPr>
+          <p:nvPr isPhoto="0" userDrawn="0">
+            <p:ph sz="half" idx="2" hasCustomPrompt="0"/>
           </p:nvPr>
         </p:nvSpPr>
         <p:spPr bwMode="auto">
@@ -1632,12 +1608,12 @@
       </p:sp>
       <p:sp>
         <p:nvSpPr>
-          <p:cNvPr id="5" name="Text Placeholder 4"/>
-          <p:cNvSpPr>
-            <a:spLocks noGrp="1"/>
-          </p:cNvSpPr>
-          <p:nvPr>
-            <p:ph type="body" sz="quarter" idx="3"/>
+          <p:cNvPr id="5" name="Text Placeholder 4" hidden="0"/>
+          <p:cNvSpPr>
+            <a:spLocks noGrp="1"/>
+          </p:cNvSpPr>
+          <p:nvPr isPhoto="0" userDrawn="0">
+            <p:ph type="body" sz="quarter" idx="3" hasCustomPrompt="0"/>
           </p:nvPr>
         </p:nvSpPr>
         <p:spPr bwMode="auto">
@@ -1700,12 +1676,12 @@
       </p:sp>
       <p:sp>
         <p:nvSpPr>
-          <p:cNvPr id="6" name="Content Placeholder 5"/>
-          <p:cNvSpPr>
-            <a:spLocks noGrp="1"/>
-          </p:cNvSpPr>
-          <p:nvPr>
-            <p:ph sz="quarter" idx="4"/>
+          <p:cNvPr id="6" name="Content Placeholder 5" hidden="0"/>
+          <p:cNvSpPr>
+            <a:spLocks noGrp="1"/>
+          </p:cNvSpPr>
+          <p:nvPr isPhoto="0" userDrawn="0">
+            <p:ph sz="quarter" idx="4" hasCustomPrompt="0"/>
           </p:nvPr>
         </p:nvSpPr>
         <p:spPr bwMode="auto">
@@ -1771,12 +1747,12 @@
       </p:sp>
       <p:sp>
         <p:nvSpPr>
-          <p:cNvPr id="7" name="Date Placeholder 6"/>
-          <p:cNvSpPr>
-            <a:spLocks noGrp="1"/>
-          </p:cNvSpPr>
-          <p:nvPr>
-            <p:ph type="dt" sz="half" idx="10"/>
+          <p:cNvPr id="7" name="Date Placeholder 6" hidden="0"/>
+          <p:cNvSpPr>
+            <a:spLocks noGrp="1"/>
+          </p:cNvSpPr>
+          <p:nvPr isPhoto="0" userDrawn="0">
+            <p:ph type="dt" sz="half" idx="10" hasCustomPrompt="0"/>
           </p:nvPr>
         </p:nvSpPr>
         <p:spPr bwMode="auto"/>
@@ -1789,7 +1765,7 @@
             </a:pPr>
             <a:fld id="{76969C88-B244-455D-A017-012B25B1ACDD}" type="datetimeFigureOut">
               <a:rPr lang="en-US"/>
-              <a:t>5/29/2022</a:t>
+              <a:t/>
             </a:fld>
             <a:endParaRPr lang="en-US"/>
           </a:p>
@@ -1797,12 +1773,12 @@
       </p:sp>
       <p:sp>
         <p:nvSpPr>
-          <p:cNvPr id="8" name="Footer Placeholder 7"/>
-          <p:cNvSpPr>
-            <a:spLocks noGrp="1"/>
-          </p:cNvSpPr>
-          <p:nvPr>
-            <p:ph type="ftr" sz="quarter" idx="11"/>
+          <p:cNvPr id="8" name="Footer Placeholder 7" hidden="0"/>
+          <p:cNvSpPr>
+            <a:spLocks noGrp="1"/>
+          </p:cNvSpPr>
+          <p:nvPr isPhoto="0" userDrawn="0">
+            <p:ph type="ftr" sz="quarter" idx="11" hasCustomPrompt="0"/>
           </p:nvPr>
         </p:nvSpPr>
         <p:spPr bwMode="auto"/>
@@ -1819,12 +1795,12 @@
       </p:sp>
       <p:sp>
         <p:nvSpPr>
-          <p:cNvPr id="9" name="Slide Number Placeholder 8"/>
-          <p:cNvSpPr>
-            <a:spLocks noGrp="1"/>
-          </p:cNvSpPr>
-          <p:nvPr>
-            <p:ph type="sldNum" sz="quarter" idx="12"/>
+          <p:cNvPr id="9" name="Slide Number Placeholder 8" hidden="0"/>
+          <p:cNvSpPr>
+            <a:spLocks noGrp="1"/>
+          </p:cNvSpPr>
+          <p:nvPr isPhoto="0" userDrawn="0">
+            <p:ph type="sldNum" sz="quarter" idx="12" hasCustomPrompt="0"/>
           </p:nvPr>
         </p:nvSpPr>
         <p:spPr bwMode="auto"/>
@@ -1837,7 +1813,7 @@
             </a:pPr>
             <a:fld id="{07CE569E-9B7C-4CB9-AB80-C0841F922CFF}" type="slidenum">
               <a:rPr lang="en-US"/>
-              <a:t>‹nº›</a:t>
+              <a:t/>
             </a:fld>
             <a:endParaRPr lang="en-US"/>
           </a:p>
@@ -1852,13 +1828,13 @@
 </file>
 
 <file path=ppt/slideLayouts/slideLayout6.xml><?xml version="1.0" encoding="utf-8"?>
-<p:sldLayout xmlns:a="http://schemas.openxmlformats.org/drawingml/2006/main" xmlns:r="http://schemas.openxmlformats.org/officeDocument/2006/relationships" xmlns:p="http://schemas.openxmlformats.org/presentationml/2006/main" showMasterPhAnim="0" type="titleOnly" preserve="1" userDrawn="1">
+<p:sldLayout xmlns:a="http://schemas.openxmlformats.org/drawingml/2006/main" xmlns:r="http://schemas.openxmlformats.org/officeDocument/2006/relationships" xmlns:p="http://schemas.openxmlformats.org/presentationml/2006/main" xmlns:m="http://schemas.openxmlformats.org/officeDocument/2006/math" xmlns:w="http://schemas.openxmlformats.org/wordprocessingml/2006/main" matchingName="" preserve="1" showMasterPhAnim="0" type="titleOnly" userDrawn="1">
   <p:cSld name="Title Only">
     <p:spTree>
       <p:nvGrpSpPr>
-        <p:cNvPr id="1" name=""/>
+        <p:cNvPr id="1" name="" hidden="0"/>
         <p:cNvGrpSpPr/>
-        <p:nvPr/>
+        <p:nvPr isPhoto="0" userDrawn="0"/>
       </p:nvGrpSpPr>
       <p:grpSpPr bwMode="auto">
         <a:xfrm>
@@ -1870,12 +1846,12 @@
       </p:grpSpPr>
       <p:sp>
         <p:nvSpPr>
-          <p:cNvPr id="2" name="Title 1"/>
-          <p:cNvSpPr>
-            <a:spLocks noGrp="1"/>
-          </p:cNvSpPr>
-          <p:nvPr>
-            <p:ph type="title"/>
+          <p:cNvPr id="2" name="Title 1" hidden="0"/>
+          <p:cNvSpPr>
+            <a:spLocks noGrp="1"/>
+          </p:cNvSpPr>
+          <p:nvPr isPhoto="0" userDrawn="0">
+            <p:ph type="title" hasCustomPrompt="0"/>
           </p:nvPr>
         </p:nvSpPr>
         <p:spPr bwMode="auto"/>
@@ -1896,12 +1872,12 @@
       </p:sp>
       <p:sp>
         <p:nvSpPr>
-          <p:cNvPr id="3" name="Date Placeholder 2"/>
-          <p:cNvSpPr>
-            <a:spLocks noGrp="1"/>
-          </p:cNvSpPr>
-          <p:nvPr>
-            <p:ph type="dt" sz="half" idx="10"/>
+          <p:cNvPr id="3" name="Date Placeholder 2" hidden="0"/>
+          <p:cNvSpPr>
+            <a:spLocks noGrp="1"/>
+          </p:cNvSpPr>
+          <p:nvPr isPhoto="0" userDrawn="0">
+            <p:ph type="dt" sz="half" idx="10" hasCustomPrompt="0"/>
           </p:nvPr>
         </p:nvSpPr>
         <p:spPr bwMode="auto"/>
@@ -1914,7 +1890,7 @@
             </a:pPr>
             <a:fld id="{76969C88-B244-455D-A017-012B25B1ACDD}" type="datetimeFigureOut">
               <a:rPr lang="en-US"/>
-              <a:t>5/29/2022</a:t>
+              <a:t/>
             </a:fld>
             <a:endParaRPr lang="en-US"/>
           </a:p>
@@ -1922,12 +1898,12 @@
       </p:sp>
       <p:sp>
         <p:nvSpPr>
-          <p:cNvPr id="4" name="Footer Placeholder 3"/>
-          <p:cNvSpPr>
-            <a:spLocks noGrp="1"/>
-          </p:cNvSpPr>
-          <p:nvPr>
-            <p:ph type="ftr" sz="quarter" idx="11"/>
+          <p:cNvPr id="4" name="Footer Placeholder 3" hidden="0"/>
+          <p:cNvSpPr>
+            <a:spLocks noGrp="1"/>
+          </p:cNvSpPr>
+          <p:nvPr isPhoto="0" userDrawn="0">
+            <p:ph type="ftr" sz="quarter" idx="11" hasCustomPrompt="0"/>
           </p:nvPr>
         </p:nvSpPr>
         <p:spPr bwMode="auto"/>
@@ -1944,12 +1920,12 @@
       </p:sp>
       <p:sp>
         <p:nvSpPr>
-          <p:cNvPr id="5" name="Slide Number Placeholder 4"/>
-          <p:cNvSpPr>
-            <a:spLocks noGrp="1"/>
-          </p:cNvSpPr>
-          <p:nvPr>
-            <p:ph type="sldNum" sz="quarter" idx="12"/>
+          <p:cNvPr id="5" name="Slide Number Placeholder 4" hidden="0"/>
+          <p:cNvSpPr>
+            <a:spLocks noGrp="1"/>
+          </p:cNvSpPr>
+          <p:nvPr isPhoto="0" userDrawn="0">
+            <p:ph type="sldNum" sz="quarter" idx="12" hasCustomPrompt="0"/>
           </p:nvPr>
         </p:nvSpPr>
         <p:spPr bwMode="auto"/>
@@ -1962,7 +1938,7 @@
             </a:pPr>
             <a:fld id="{07CE569E-9B7C-4CB9-AB80-C0841F922CFF}" type="slidenum">
               <a:rPr lang="en-US"/>
-              <a:t>‹nº›</a:t>
+              <a:t/>
             </a:fld>
             <a:endParaRPr lang="en-US"/>
           </a:p>
@@ -1977,13 +1953,13 @@
 </file>
 
 <file path=ppt/slideLayouts/slideLayout7.xml><?xml version="1.0" encoding="utf-8"?>
-<p:sldLayout xmlns:a="http://schemas.openxmlformats.org/drawingml/2006/main" xmlns:r="http://schemas.openxmlformats.org/officeDocument/2006/relationships" xmlns:p="http://schemas.openxmlformats.org/presentationml/2006/main" showMasterPhAnim="0" type="blank" preserve="1" userDrawn="1">
+<p:sldLayout xmlns:a="http://schemas.openxmlformats.org/drawingml/2006/main" xmlns:r="http://schemas.openxmlformats.org/officeDocument/2006/relationships" xmlns:p="http://schemas.openxmlformats.org/presentationml/2006/main" xmlns:m="http://schemas.openxmlformats.org/officeDocument/2006/math" xmlns:w="http://schemas.openxmlformats.org/wordprocessingml/2006/main" matchingName="" preserve="1" showMasterPhAnim="0" type="blank" userDrawn="1">
   <p:cSld name="Blank">
     <p:spTree>
       <p:nvGrpSpPr>
-        <p:cNvPr id="1" name=""/>
+        <p:cNvPr id="1" name="" hidden="0"/>
         <p:cNvGrpSpPr/>
-        <p:nvPr/>
+        <p:nvPr isPhoto="0" userDrawn="0"/>
       </p:nvGrpSpPr>
       <p:grpSpPr bwMode="auto">
         <a:xfrm>
@@ -1995,12 +1971,12 @@
       </p:grpSpPr>
       <p:sp>
         <p:nvSpPr>
-          <p:cNvPr id="2" name="Date Placeholder 1"/>
-          <p:cNvSpPr>
-            <a:spLocks noGrp="1"/>
-          </p:cNvSpPr>
-          <p:nvPr>
-            <p:ph type="dt" sz="half" idx="10"/>
+          <p:cNvPr id="2" name="Date Placeholder 1" hidden="0"/>
+          <p:cNvSpPr>
+            <a:spLocks noGrp="1"/>
+          </p:cNvSpPr>
+          <p:nvPr isPhoto="0" userDrawn="0">
+            <p:ph type="dt" sz="half" idx="10" hasCustomPrompt="0"/>
           </p:nvPr>
         </p:nvSpPr>
         <p:spPr bwMode="auto"/>
@@ -2013,7 +1989,7 @@
             </a:pPr>
             <a:fld id="{76969C88-B244-455D-A017-012B25B1ACDD}" type="datetimeFigureOut">
               <a:rPr lang="en-US"/>
-              <a:t>5/29/2022</a:t>
+              <a:t/>
             </a:fld>
             <a:endParaRPr lang="en-US"/>
           </a:p>
@@ -2021,12 +1997,12 @@
       </p:sp>
       <p:sp>
         <p:nvSpPr>
-          <p:cNvPr id="3" name="Footer Placeholder 2"/>
-          <p:cNvSpPr>
-            <a:spLocks noGrp="1"/>
-          </p:cNvSpPr>
-          <p:nvPr>
-            <p:ph type="ftr" sz="quarter" idx="11"/>
+          <p:cNvPr id="3" name="Footer Placeholder 2" hidden="0"/>
+          <p:cNvSpPr>
+            <a:spLocks noGrp="1"/>
+          </p:cNvSpPr>
+          <p:nvPr isPhoto="0" userDrawn="0">
+            <p:ph type="ftr" sz="quarter" idx="11" hasCustomPrompt="0"/>
           </p:nvPr>
         </p:nvSpPr>
         <p:spPr bwMode="auto"/>
@@ -2043,12 +2019,12 @@
       </p:sp>
       <p:sp>
         <p:nvSpPr>
-          <p:cNvPr id="4" name="Slide Number Placeholder 3"/>
-          <p:cNvSpPr>
-            <a:spLocks noGrp="1"/>
-          </p:cNvSpPr>
-          <p:nvPr>
-            <p:ph type="sldNum" sz="quarter" idx="12"/>
+          <p:cNvPr id="4" name="Slide Number Placeholder 3" hidden="0"/>
+          <p:cNvSpPr>
+            <a:spLocks noGrp="1"/>
+          </p:cNvSpPr>
+          <p:nvPr isPhoto="0" userDrawn="0">
+            <p:ph type="sldNum" sz="quarter" idx="12" hasCustomPrompt="0"/>
           </p:nvPr>
         </p:nvSpPr>
         <p:spPr bwMode="auto"/>
@@ -2061,7 +2037,7 @@
             </a:pPr>
             <a:fld id="{07CE569E-9B7C-4CB9-AB80-C0841F922CFF}" type="slidenum">
               <a:rPr lang="en-US"/>
-              <a:t>‹nº›</a:t>
+              <a:t/>
             </a:fld>
             <a:endParaRPr lang="en-US"/>
           </a:p>
@@ -2076,13 +2052,13 @@
 </file>
 
 <file path=ppt/slideLayouts/slideLayout8.xml><?xml version="1.0" encoding="utf-8"?>
-<p:sldLayout xmlns:a="http://schemas.openxmlformats.org/drawingml/2006/main" xmlns:r="http://schemas.openxmlformats.org/officeDocument/2006/relationships" xmlns:p="http://schemas.openxmlformats.org/presentationml/2006/main" showMasterPhAnim="0" type="objTx" preserve="1" userDrawn="1">
+<p:sldLayout xmlns:a="http://schemas.openxmlformats.org/drawingml/2006/main" xmlns:r="http://schemas.openxmlformats.org/officeDocument/2006/relationships" xmlns:p="http://schemas.openxmlformats.org/presentationml/2006/main" xmlns:m="http://schemas.openxmlformats.org/officeDocument/2006/math" xmlns:w="http://schemas.openxmlformats.org/wordprocessingml/2006/main" matchingName="" preserve="1" showMasterPhAnim="0" type="objTx" userDrawn="1">
   <p:cSld name="Content with Caption">
     <p:spTree>
       <p:nvGrpSpPr>
-        <p:cNvPr id="1" name=""/>
+        <p:cNvPr id="1" name="" hidden="0"/>
         <p:cNvGrpSpPr/>
-        <p:nvPr/>
+        <p:nvPr isPhoto="0" userDrawn="0"/>
       </p:nvGrpSpPr>
       <p:grpSpPr bwMode="auto">
         <a:xfrm>
@@ -2094,12 +2070,12 @@
       </p:grpSpPr>
       <p:sp>
         <p:nvSpPr>
-          <p:cNvPr id="2" name="Title 1"/>
-          <p:cNvSpPr>
-            <a:spLocks noGrp="1"/>
-          </p:cNvSpPr>
-          <p:nvPr>
-            <p:ph type="title"/>
+          <p:cNvPr id="2" name="Title 1" hidden="0"/>
+          <p:cNvSpPr>
+            <a:spLocks noGrp="1"/>
+          </p:cNvSpPr>
+          <p:nvPr isPhoto="0" userDrawn="0">
+            <p:ph type="title" hasCustomPrompt="0"/>
           </p:nvPr>
         </p:nvSpPr>
         <p:spPr bwMode="auto">
@@ -2123,17 +2099,18 @@
               <a:rPr lang="en-US"/>
               <a:t>Click to edit Master title style</a:t>
             </a:r>
-          </a:p>
-        </p:txBody>
-      </p:sp>
-      <p:sp>
-        <p:nvSpPr>
-          <p:cNvPr id="3" name="Content Placeholder 2"/>
-          <p:cNvSpPr>
-            <a:spLocks noGrp="1"/>
-          </p:cNvSpPr>
-          <p:nvPr>
-            <p:ph idx="1"/>
+            <a:endParaRPr/>
+          </a:p>
+        </p:txBody>
+      </p:sp>
+      <p:sp>
+        <p:nvSpPr>
+          <p:cNvPr id="3" name="Content Placeholder 2" hidden="0"/>
+          <p:cNvSpPr>
+            <a:spLocks noGrp="1"/>
+          </p:cNvSpPr>
+          <p:nvPr isPhoto="0" userDrawn="0">
+            <p:ph idx="1" hasCustomPrompt="0"/>
           </p:nvPr>
         </p:nvSpPr>
         <p:spPr bwMode="auto">
@@ -2227,12 +2204,12 @@
       </p:sp>
       <p:sp>
         <p:nvSpPr>
-          <p:cNvPr id="4" name="Text Placeholder 3"/>
-          <p:cNvSpPr>
-            <a:spLocks noGrp="1"/>
-          </p:cNvSpPr>
-          <p:nvPr>
-            <p:ph type="body" sz="half" idx="2"/>
+          <p:cNvPr id="4" name="Text Placeholder 3" hidden="0"/>
+          <p:cNvSpPr>
+            <a:spLocks noGrp="1"/>
+          </p:cNvSpPr>
+          <p:nvPr isPhoto="0" userDrawn="0">
+            <p:ph type="body" sz="half" idx="2" hasCustomPrompt="0"/>
           </p:nvPr>
         </p:nvSpPr>
         <p:spPr bwMode="auto">
@@ -2295,12 +2272,12 @@
       </p:sp>
       <p:sp>
         <p:nvSpPr>
-          <p:cNvPr id="5" name="Date Placeholder 4"/>
-          <p:cNvSpPr>
-            <a:spLocks noGrp="1"/>
-          </p:cNvSpPr>
-          <p:nvPr>
-            <p:ph type="dt" sz="half" idx="10"/>
+          <p:cNvPr id="5" name="Date Placeholder 4" hidden="0"/>
+          <p:cNvSpPr>
+            <a:spLocks noGrp="1"/>
+          </p:cNvSpPr>
+          <p:nvPr isPhoto="0" userDrawn="0">
+            <p:ph type="dt" sz="half" idx="10" hasCustomPrompt="0"/>
           </p:nvPr>
         </p:nvSpPr>
         <p:spPr bwMode="auto"/>
@@ -2313,7 +2290,7 @@
             </a:pPr>
             <a:fld id="{76969C88-B244-455D-A017-012B25B1ACDD}" type="datetimeFigureOut">
               <a:rPr lang="en-US"/>
-              <a:t>5/29/2022</a:t>
+              <a:t/>
             </a:fld>
             <a:endParaRPr lang="en-US"/>
           </a:p>
@@ -2321,12 +2298,12 @@
       </p:sp>
       <p:sp>
         <p:nvSpPr>
-          <p:cNvPr id="6" name="Footer Placeholder 5"/>
-          <p:cNvSpPr>
-            <a:spLocks noGrp="1"/>
-          </p:cNvSpPr>
-          <p:nvPr>
-            <p:ph type="ftr" sz="quarter" idx="11"/>
+          <p:cNvPr id="6" name="Footer Placeholder 5" hidden="0"/>
+          <p:cNvSpPr>
+            <a:spLocks noGrp="1"/>
+          </p:cNvSpPr>
+          <p:nvPr isPhoto="0" userDrawn="0">
+            <p:ph type="ftr" sz="quarter" idx="11" hasCustomPrompt="0"/>
           </p:nvPr>
         </p:nvSpPr>
         <p:spPr bwMode="auto"/>
@@ -2343,12 +2320,12 @@
       </p:sp>
       <p:sp>
         <p:nvSpPr>
-          <p:cNvPr id="7" name="Slide Number Placeholder 6"/>
-          <p:cNvSpPr>
-            <a:spLocks noGrp="1"/>
-          </p:cNvSpPr>
-          <p:nvPr>
-            <p:ph type="sldNum" sz="quarter" idx="12"/>
+          <p:cNvPr id="7" name="Slide Number Placeholder 6" hidden="0"/>
+          <p:cNvSpPr>
+            <a:spLocks noGrp="1"/>
+          </p:cNvSpPr>
+          <p:nvPr isPhoto="0" userDrawn="0">
+            <p:ph type="sldNum" sz="quarter" idx="12" hasCustomPrompt="0"/>
           </p:nvPr>
         </p:nvSpPr>
         <p:spPr bwMode="auto"/>
@@ -2361,7 +2338,7 @@
             </a:pPr>
             <a:fld id="{07CE569E-9B7C-4CB9-AB80-C0841F922CFF}" type="slidenum">
               <a:rPr lang="en-US"/>
-              <a:t>‹nº›</a:t>
+              <a:t/>
             </a:fld>
             <a:endParaRPr lang="en-US"/>
           </a:p>
@@ -2376,13 +2353,13 @@
 </file>
 
 <file path=ppt/slideLayouts/slideLayout9.xml><?xml version="1.0" encoding="utf-8"?>
-<p:sldLayout xmlns:a="http://schemas.openxmlformats.org/drawingml/2006/main" xmlns:r="http://schemas.openxmlformats.org/officeDocument/2006/relationships" xmlns:p="http://schemas.openxmlformats.org/presentationml/2006/main" showMasterPhAnim="0" type="picTx" preserve="1" userDrawn="1">
+<p:sldLayout xmlns:a="http://schemas.openxmlformats.org/drawingml/2006/main" xmlns:r="http://schemas.openxmlformats.org/officeDocument/2006/relationships" xmlns:p="http://schemas.openxmlformats.org/presentationml/2006/main" xmlns:m="http://schemas.openxmlformats.org/officeDocument/2006/math" xmlns:w="http://schemas.openxmlformats.org/wordprocessingml/2006/main" matchingName="" preserve="1" showMasterPhAnim="0" type="picTx" userDrawn="1">
   <p:cSld name="Picture with Caption">
     <p:spTree>
       <p:nvGrpSpPr>
-        <p:cNvPr id="1" name=""/>
+        <p:cNvPr id="1" name="" hidden="0"/>
         <p:cNvGrpSpPr/>
-        <p:nvPr/>
+        <p:nvPr isPhoto="0" userDrawn="0"/>
       </p:nvGrpSpPr>
       <p:grpSpPr bwMode="auto">
         <a:xfrm>
@@ -2394,12 +2371,12 @@
       </p:grpSpPr>
       <p:sp>
         <p:nvSpPr>
-          <p:cNvPr id="2" name="Title 1"/>
-          <p:cNvSpPr>
-            <a:spLocks noGrp="1"/>
-          </p:cNvSpPr>
-          <p:nvPr>
-            <p:ph type="title"/>
+          <p:cNvPr id="2" name="Title 1" hidden="0"/>
+          <p:cNvSpPr>
+            <a:spLocks noGrp="1"/>
+          </p:cNvSpPr>
+          <p:nvPr isPhoto="0" userDrawn="0">
+            <p:ph type="title" hasCustomPrompt="0"/>
           </p:nvPr>
         </p:nvSpPr>
         <p:spPr bwMode="auto">
@@ -2429,12 +2406,12 @@
       </p:sp>
       <p:sp>
         <p:nvSpPr>
-          <p:cNvPr id="3" name="Picture Placeholder 2"/>
-          <p:cNvSpPr>
-            <a:spLocks noGrp="1"/>
-          </p:cNvSpPr>
-          <p:nvPr>
-            <p:ph type="pic" idx="1"/>
+          <p:cNvPr id="3" name="Picture Placeholder 2" hidden="0"/>
+          <p:cNvSpPr>
+            <a:spLocks noGrp="1"/>
+          </p:cNvSpPr>
+          <p:nvPr isPhoto="0" userDrawn="0">
+            <p:ph type="pic" idx="1" hasCustomPrompt="0"/>
           </p:nvPr>
         </p:nvSpPr>
         <p:spPr bwMode="auto">
@@ -2497,12 +2474,12 @@
       </p:sp>
       <p:sp>
         <p:nvSpPr>
-          <p:cNvPr id="4" name="Text Placeholder 3"/>
-          <p:cNvSpPr>
-            <a:spLocks noGrp="1"/>
-          </p:cNvSpPr>
-          <p:nvPr>
-            <p:ph type="body" sz="half" idx="2"/>
+          <p:cNvPr id="4" name="Text Placeholder 3" hidden="0"/>
+          <p:cNvSpPr>
+            <a:spLocks noGrp="1"/>
+          </p:cNvSpPr>
+          <p:nvPr isPhoto="0" userDrawn="0">
+            <p:ph type="body" sz="half" idx="2" hasCustomPrompt="0"/>
           </p:nvPr>
         </p:nvSpPr>
         <p:spPr bwMode="auto">
@@ -2565,12 +2542,12 @@
       </p:sp>
       <p:sp>
         <p:nvSpPr>
-          <p:cNvPr id="5" name="Date Placeholder 4"/>
-          <p:cNvSpPr>
-            <a:spLocks noGrp="1"/>
-          </p:cNvSpPr>
-          <p:nvPr>
-            <p:ph type="dt" sz="half" idx="10"/>
+          <p:cNvPr id="5" name="Date Placeholder 4" hidden="0"/>
+          <p:cNvSpPr>
+            <a:spLocks noGrp="1"/>
+          </p:cNvSpPr>
+          <p:nvPr isPhoto="0" userDrawn="0">
+            <p:ph type="dt" sz="half" idx="10" hasCustomPrompt="0"/>
           </p:nvPr>
         </p:nvSpPr>
         <p:spPr bwMode="auto"/>
@@ -2583,7 +2560,7 @@
             </a:pPr>
             <a:fld id="{76969C88-B244-455D-A017-012B25B1ACDD}" type="datetimeFigureOut">
               <a:rPr lang="en-US"/>
-              <a:t>5/29/2022</a:t>
+              <a:t/>
             </a:fld>
             <a:endParaRPr lang="en-US"/>
           </a:p>
@@ -2591,12 +2568,12 @@
       </p:sp>
       <p:sp>
         <p:nvSpPr>
-          <p:cNvPr id="6" name="Footer Placeholder 5"/>
-          <p:cNvSpPr>
-            <a:spLocks noGrp="1"/>
-          </p:cNvSpPr>
-          <p:nvPr>
-            <p:ph type="ftr" sz="quarter" idx="11"/>
+          <p:cNvPr id="6" name="Footer Placeholder 5" hidden="0"/>
+          <p:cNvSpPr>
+            <a:spLocks noGrp="1"/>
+          </p:cNvSpPr>
+          <p:nvPr isPhoto="0" userDrawn="0">
+            <p:ph type="ftr" sz="quarter" idx="11" hasCustomPrompt="0"/>
           </p:nvPr>
         </p:nvSpPr>
         <p:spPr bwMode="auto"/>
@@ -2613,12 +2590,12 @@
       </p:sp>
       <p:sp>
         <p:nvSpPr>
-          <p:cNvPr id="7" name="Slide Number Placeholder 6"/>
-          <p:cNvSpPr>
-            <a:spLocks noGrp="1"/>
-          </p:cNvSpPr>
-          <p:nvPr>
-            <p:ph type="sldNum" sz="quarter" idx="12"/>
+          <p:cNvPr id="7" name="Slide Number Placeholder 6" hidden="0"/>
+          <p:cNvSpPr>
+            <a:spLocks noGrp="1"/>
+          </p:cNvSpPr>
+          <p:nvPr isPhoto="0" userDrawn="0">
+            <p:ph type="sldNum" sz="quarter" idx="12" hasCustomPrompt="0"/>
           </p:nvPr>
         </p:nvSpPr>
         <p:spPr bwMode="auto"/>
@@ -2631,7 +2608,7 @@
             </a:pPr>
             <a:fld id="{07CE569E-9B7C-4CB9-AB80-C0841F922CFF}" type="slidenum">
               <a:rPr lang="en-US"/>
-              <a:t>‹nº›</a:t>
+              <a:t/>
             </a:fld>
             <a:endParaRPr lang="en-US"/>
           </a:p>
@@ -2646,8 +2623,8 @@
 </file>
 
 <file path=ppt/slideMasters/slideMaster1.xml><?xml version="1.0" encoding="utf-8"?>
-<p:sldMaster xmlns:a="http://schemas.openxmlformats.org/drawingml/2006/main" xmlns:r="http://schemas.openxmlformats.org/officeDocument/2006/relationships" xmlns:p="http://schemas.openxmlformats.org/presentationml/2006/main">
-  <p:cSld>
+<p:sldMaster xmlns:a="http://schemas.openxmlformats.org/drawingml/2006/main" xmlns:r="http://schemas.openxmlformats.org/officeDocument/2006/relationships" xmlns:p="http://schemas.openxmlformats.org/presentationml/2006/main" xmlns:m="http://schemas.openxmlformats.org/officeDocument/2006/math" xmlns:w="http://schemas.openxmlformats.org/wordprocessingml/2006/main" preserve="0">
+  <p:cSld name="">
     <p:bg>
       <p:bgRef idx="1001">
         <a:schemeClr val="bg2"/>
@@ -2655,9 +2632,9 @@
     </p:bg>
     <p:spTree>
       <p:nvGrpSpPr>
-        <p:cNvPr id="1" name=""/>
+        <p:cNvPr id="1" name="" hidden="0"/>
         <p:cNvGrpSpPr/>
-        <p:nvPr/>
+        <p:nvPr isPhoto="0" userDrawn="0"/>
       </p:nvGrpSpPr>
       <p:grpSpPr bwMode="auto">
         <a:xfrm>
@@ -2669,9 +2646,9 @@
       </p:grpSpPr>
       <p:sp>
         <p:nvSpPr>
-          <p:cNvPr id="8" name="Freeform: Shape 7"/>
+          <p:cNvPr id="8" name="Freeform: Shape 7" hidden="0"/>
           <p:cNvSpPr/>
-          <p:nvPr/>
+          <p:nvPr isPhoto="0" userDrawn="0"/>
         </p:nvSpPr>
         <p:spPr bwMode="auto">
           <a:xfrm>
@@ -2737,7 +2714,7 @@
             </a:cxnLst>
             <a:rect l="l" t="t" r="r" b="b"/>
             <a:pathLst>
-              <a:path w="4034156" h="613164" extrusionOk="0">
+              <a:path w="4034156" h="613164" fill="norm" stroke="1" extrusionOk="0">
                 <a:moveTo>
                   <a:pt x="1479137" y="230"/>
                 </a:moveTo>
@@ -2843,9 +2820,9 @@
       </p:sp>
       <p:sp>
         <p:nvSpPr>
-          <p:cNvPr id="11" name="Freeform: Shape 10"/>
+          <p:cNvPr id="11" name="Freeform: Shape 10" hidden="0"/>
           <p:cNvSpPr/>
-          <p:nvPr/>
+          <p:nvPr isPhoto="0" userDrawn="0"/>
         </p:nvSpPr>
         <p:spPr bwMode="auto">
           <a:xfrm>
@@ -2891,7 +2868,7 @@
             </a:cxnLst>
             <a:rect l="l" t="t" r="r" b="b"/>
             <a:pathLst>
-              <a:path w="448491" h="1634252" extrusionOk="0">
+              <a:path w="448491" h="1634252" fill="norm" stroke="1" extrusionOk="0">
                 <a:moveTo>
                   <a:pt x="0" y="0"/>
                 </a:moveTo>
@@ -2963,9 +2940,9 @@
       </p:sp>
       <p:sp>
         <p:nvSpPr>
-          <p:cNvPr id="12" name="Freeform: Shape 11"/>
+          <p:cNvPr id="12" name="Freeform: Shape 11" hidden="0"/>
           <p:cNvSpPr/>
-          <p:nvPr/>
+          <p:nvPr isPhoto="0" userDrawn="0"/>
         </p:nvSpPr>
         <p:spPr bwMode="auto">
           <a:xfrm>
@@ -3064,7 +3041,7 @@
             </a:cxnLst>
             <a:rect l="l" t="t" r="r" b="b"/>
             <a:pathLst>
-              <a:path w="4418271" h="718159" extrusionOk="0">
+              <a:path w="4418271" h="718159" fill="norm" stroke="1" extrusionOk="0">
                 <a:moveTo>
                   <a:pt x="0" y="713930"/>
                 </a:moveTo>
@@ -3156,12 +3133,12 @@
       </p:sp>
       <p:sp>
         <p:nvSpPr>
-          <p:cNvPr id="2" name="Title Placeholder 1"/>
-          <p:cNvSpPr>
-            <a:spLocks noGrp="1"/>
-          </p:cNvSpPr>
-          <p:nvPr>
-            <p:ph type="title"/>
+          <p:cNvPr id="2" name="Title Placeholder 1" hidden="0"/>
+          <p:cNvSpPr>
+            <a:spLocks noGrp="1"/>
+          </p:cNvSpPr>
+          <p:nvPr isPhoto="0" userDrawn="0">
+            <p:ph type="title" hasCustomPrompt="0"/>
           </p:nvPr>
         </p:nvSpPr>
         <p:spPr bwMode="auto">
@@ -3186,17 +3163,18 @@
               <a:rPr lang="en-US"/>
               <a:t>Click to edit Master title style</a:t>
             </a:r>
-          </a:p>
-        </p:txBody>
-      </p:sp>
-      <p:sp>
-        <p:nvSpPr>
-          <p:cNvPr id="3" name="Text Placeholder 2"/>
-          <p:cNvSpPr>
-            <a:spLocks noGrp="1"/>
-          </p:cNvSpPr>
-          <p:nvPr>
-            <p:ph type="body" idx="1"/>
+            <a:endParaRPr/>
+          </a:p>
+        </p:txBody>
+      </p:sp>
+      <p:sp>
+        <p:nvSpPr>
+          <p:cNvPr id="3" name="Text Placeholder 2" hidden="0"/>
+          <p:cNvSpPr>
+            <a:spLocks noGrp="1"/>
+          </p:cNvSpPr>
+          <p:nvPr isPhoto="0" userDrawn="0">
+            <p:ph type="body" idx="1" hasCustomPrompt="0"/>
           </p:nvPr>
         </p:nvSpPr>
         <p:spPr bwMode="auto">
@@ -3261,17 +3239,18 @@
               <a:rPr lang="en-US"/>
               <a:t>Fifth level</a:t>
             </a:r>
-          </a:p>
-        </p:txBody>
-      </p:sp>
-      <p:sp>
-        <p:nvSpPr>
-          <p:cNvPr id="4" name="Date Placeholder 3"/>
-          <p:cNvSpPr>
-            <a:spLocks noGrp="1"/>
-          </p:cNvSpPr>
-          <p:nvPr>
-            <p:ph type="dt" sz="half" idx="2"/>
+            <a:endParaRPr/>
+          </a:p>
+        </p:txBody>
+      </p:sp>
+      <p:sp>
+        <p:nvSpPr>
+          <p:cNvPr id="4" name="Date Placeholder 3" hidden="0"/>
+          <p:cNvSpPr>
+            <a:spLocks noGrp="1"/>
+          </p:cNvSpPr>
+          <p:nvPr isPhoto="0" userDrawn="0">
+            <p:ph type="dt" sz="half" idx="2" hasCustomPrompt="0"/>
           </p:nvPr>
         </p:nvSpPr>
         <p:spPr bwMode="auto">
@@ -3303,7 +3282,7 @@
             </a:pPr>
             <a:fld id="{76969C88-B244-455D-A017-012B25B1ACDD}" type="datetimeFigureOut">
               <a:rPr lang="en-US"/>
-              <a:t>5/29/2022</a:t>
+              <a:t/>
             </a:fld>
             <a:endParaRPr lang="en-US"/>
           </a:p>
@@ -3311,12 +3290,12 @@
       </p:sp>
       <p:sp>
         <p:nvSpPr>
-          <p:cNvPr id="5" name="Footer Placeholder 4"/>
-          <p:cNvSpPr>
-            <a:spLocks noGrp="1"/>
-          </p:cNvSpPr>
-          <p:nvPr>
-            <p:ph type="ftr" sz="quarter" idx="3"/>
+          <p:cNvPr id="5" name="Footer Placeholder 4" hidden="0"/>
+          <p:cNvSpPr>
+            <a:spLocks noGrp="1"/>
+          </p:cNvSpPr>
+          <p:nvPr isPhoto="0" userDrawn="0">
+            <p:ph type="ftr" sz="quarter" idx="3" hasCustomPrompt="0"/>
           </p:nvPr>
         </p:nvSpPr>
         <p:spPr bwMode="auto">
@@ -3352,12 +3331,12 @@
       </p:sp>
       <p:sp>
         <p:nvSpPr>
-          <p:cNvPr id="6" name="Slide Number Placeholder 5"/>
-          <p:cNvSpPr>
-            <a:spLocks noGrp="1"/>
-          </p:cNvSpPr>
-          <p:nvPr>
-            <p:ph type="sldNum" sz="quarter" idx="4"/>
+          <p:cNvPr id="6" name="Slide Number Placeholder 5" hidden="0"/>
+          <p:cNvSpPr>
+            <a:spLocks noGrp="1"/>
+          </p:cNvSpPr>
+          <p:nvPr isPhoto="0" userDrawn="0">
+            <p:ph type="sldNum" sz="quarter" idx="4" hasCustomPrompt="0"/>
           </p:nvPr>
         </p:nvSpPr>
         <p:spPr bwMode="auto">
@@ -3389,7 +3368,7 @@
             </a:pPr>
             <a:fld id="{07CE569E-9B7C-4CB9-AB80-C0841F922CFF}" type="slidenum">
               <a:rPr lang="en-US"/>
-              <a:t>‹nº›</a:t>
+              <a:t/>
             </a:fld>
             <a:endParaRPr lang="en-US"/>
           </a:p>
@@ -3705,21 +3684,20 @@
 </file>
 
 <file path=ppt/slides/slide1.xml><?xml version="1.0" encoding="utf-8"?>
-<p:sld xmlns:a="http://schemas.openxmlformats.org/drawingml/2006/main" xmlns:r="http://schemas.openxmlformats.org/officeDocument/2006/relationships" xmlns:p="http://schemas.openxmlformats.org/presentationml/2006/main" showMasterPhAnim="0">
-  <p:cSld>
+<p:sld xmlns:a="http://schemas.openxmlformats.org/drawingml/2006/main" xmlns:r="http://schemas.openxmlformats.org/officeDocument/2006/relationships" xmlns:p="http://schemas.openxmlformats.org/presentationml/2006/main" xmlns:m="http://schemas.openxmlformats.org/officeDocument/2006/math" xmlns:w="http://schemas.openxmlformats.org/wordprocessingml/2006/main" showMasterPhAnim="0" show="1">
+  <p:cSld name="">
     <p:bg>
-      <p:bgPr>
+      <p:bgPr shadeToTitle="0">
         <a:solidFill>
           <a:schemeClr val="bg2"/>
         </a:solidFill>
-        <a:effectLst/>
       </p:bgPr>
     </p:bg>
     <p:spTree>
       <p:nvGrpSpPr>
-        <p:cNvPr id="1" name=""/>
+        <p:cNvPr id="1" name="" hidden="0"/>
         <p:cNvGrpSpPr/>
-        <p:nvPr/>
+        <p:nvPr isPhoto="0" userDrawn="0"/>
       </p:nvGrpSpPr>
       <p:grpSpPr bwMode="auto">
         <a:xfrm>
@@ -3731,11 +3709,11 @@
       </p:grpSpPr>
       <p:sp useBgFill="1">
         <p:nvSpPr>
-          <p:cNvPr id="71" name="Rectangle 70"/>
-          <p:cNvSpPr>
-            <a:spLocks noGrp="1" noRot="1" noChangeAspect="1" noMove="1" noResize="1" noEditPoints="1" noAdjustHandles="1" noChangeArrowheads="1" noChangeShapeType="1" noTextEdit="1"/>
-          </p:cNvSpPr>
-          <p:nvPr/>
+          <p:cNvPr id="71" name="Rectangle 70" hidden="0"/>
+          <p:cNvSpPr>
+            <a:spLocks noAdjustHandles="1" noChangeArrowheads="1" noChangeAspect="1" noChangeShapeType="1" noEditPoints="1" noGrp="1" noMove="1" noResize="1" noRot="1" noTextEdit="1"/>
+          </p:cNvSpPr>
+          <p:nvPr isPhoto="0" userDrawn="0"/>
         </p:nvSpPr>
         <p:spPr bwMode="auto">
           <a:xfrm>
@@ -3781,12 +3759,12 @@
       </p:sp>
       <p:sp>
         <p:nvSpPr>
-          <p:cNvPr id="2" name="Título 1"/>
-          <p:cNvSpPr>
-            <a:spLocks noGrp="1"/>
-          </p:cNvSpPr>
-          <p:nvPr>
-            <p:ph type="ctrTitle"/>
+          <p:cNvPr id="2" name="Título 1" hidden="0"/>
+          <p:cNvSpPr>
+            <a:spLocks noGrp="1"/>
+          </p:cNvSpPr>
+          <p:nvPr isPhoto="0" userDrawn="0">
+            <p:ph type="ctrTitle" hasCustomPrompt="0"/>
           </p:nvPr>
         </p:nvSpPr>
         <p:spPr bwMode="auto">
@@ -3805,27 +3783,28 @@
               <a:defRPr/>
             </a:pPr>
             <a:r>
-              <a:rPr lang="en-GB" sz="3600" dirty="0"/>
+              <a:rPr lang="en-GB" sz="3600"/>
               <a:t>Supervised Learning Telco Customer Churn</a:t>
             </a:r>
             <a:br>
-              <a:rPr lang="en-GB" sz="3600" dirty="0"/>
+              <a:rPr lang="en-GB" sz="3600"/>
             </a:br>
             <a:r>
-              <a:rPr lang="pt-PT" sz="1600" dirty="0"/>
+              <a:rPr lang="pt-PT" sz="1600"/>
               <a:t>IART Project 2</a:t>
             </a:r>
-          </a:p>
-        </p:txBody>
-      </p:sp>
-      <p:sp>
-        <p:nvSpPr>
-          <p:cNvPr id="3" name="Subtítulo 2"/>
-          <p:cNvSpPr>
-            <a:spLocks noGrp="1"/>
-          </p:cNvSpPr>
-          <p:nvPr>
-            <p:ph type="subTitle" idx="1"/>
+            <a:endParaRPr/>
+          </a:p>
+        </p:txBody>
+      </p:sp>
+      <p:sp>
+        <p:nvSpPr>
+          <p:cNvPr id="3" name="Subtítulo 2" hidden="0"/>
+          <p:cNvSpPr>
+            <a:spLocks noGrp="1"/>
+          </p:cNvSpPr>
+          <p:nvPr isPhoto="0" userDrawn="0">
+            <p:ph type="subTitle" idx="1" hasCustomPrompt="0"/>
           </p:nvPr>
         </p:nvSpPr>
         <p:spPr bwMode="auto">
@@ -3873,11 +3852,11 @@
       </p:sp>
       <p:sp>
         <p:nvSpPr>
-          <p:cNvPr id="73" name="Freeform: Shape 72"/>
-          <p:cNvSpPr>
-            <a:spLocks noGrp="1" noRot="1" noChangeAspect="1" noMove="1" noResize="1" noEditPoints="1" noAdjustHandles="1" noChangeArrowheads="1" noChangeShapeType="1" noTextEdit="1"/>
-          </p:cNvSpPr>
-          <p:nvPr/>
+          <p:cNvPr id="73" name="Freeform: Shape 72" hidden="0"/>
+          <p:cNvSpPr>
+            <a:spLocks noAdjustHandles="1" noChangeArrowheads="1" noChangeAspect="1" noChangeShapeType="1" noEditPoints="1" noGrp="1" noMove="1" noResize="1" noRot="1" noTextEdit="1"/>
+          </p:cNvSpPr>
+          <p:nvPr isPhoto="0" userDrawn="0"/>
         </p:nvSpPr>
         <p:spPr bwMode="auto">
           <a:xfrm>
@@ -3943,7 +3922,7 @@
             </a:cxnLst>
             <a:rect l="l" t="t" r="r" b="b"/>
             <a:pathLst>
-              <a:path w="5948806" h="6095979" extrusionOk="0">
+              <a:path w="5948806" h="6095979" fill="norm" stroke="1" extrusionOk="0">
                 <a:moveTo>
                   <a:pt x="1573832" y="765"/>
                 </a:moveTo>
@@ -4026,11 +4005,11 @@
       </p:sp>
       <p:sp>
         <p:nvSpPr>
-          <p:cNvPr id="75" name="Freeform: Shape 74"/>
-          <p:cNvSpPr>
-            <a:spLocks noGrp="1" noRot="1" noChangeAspect="1" noMove="1" noResize="1" noEditPoints="1" noAdjustHandles="1" noChangeArrowheads="1" noChangeShapeType="1" noTextEdit="1"/>
-          </p:cNvSpPr>
-          <p:nvPr/>
+          <p:cNvPr id="75" name="Freeform: Shape 74" hidden="0"/>
+          <p:cNvSpPr>
+            <a:spLocks noAdjustHandles="1" noChangeArrowheads="1" noChangeAspect="1" noChangeShapeType="1" noEditPoints="1" noGrp="1" noMove="1" noResize="1" noRot="1" noTextEdit="1"/>
+          </p:cNvSpPr>
+          <p:nvPr isPhoto="0" userDrawn="0"/>
         </p:nvSpPr>
         <p:spPr bwMode="auto">
           <a:xfrm rot="5400000" flipH="1">
@@ -4138,7 +4117,7 @@
             </a:cxnLst>
             <a:rect l="l" t="t" r="r" b="b"/>
             <a:pathLst>
-              <a:path w="2154655" h="6858000" extrusionOk="0">
+              <a:path w="2154655" h="6858000" fill="norm" stroke="1" extrusionOk="0">
                 <a:moveTo>
                   <a:pt x="0" y="0"/>
                 </a:moveTo>
@@ -4210,11 +4189,11 @@
       </p:sp>
       <p:pic>
         <p:nvPicPr>
-          <p:cNvPr id="53" name="Imagem 52" descr="Uma imagem com símbolo, exterior, sentado, paragem&#10;&#10;Descrição gerada automaticamente"/>
+          <p:cNvPr id="53" name="Imagem 52" descr="Uma imagem com símbolo, exterior, sentado, paragem&#10;&#10;Descrição gerada automaticamente" hidden="0"/>
           <p:cNvPicPr>
             <a:picLocks noChangeAspect="1"/>
           </p:cNvPicPr>
-          <p:nvPr/>
+          <p:nvPr isPhoto="0" userDrawn="0"/>
         </p:nvPicPr>
         <p:blipFill>
           <a:blip r:embed="rId2"/>
@@ -4235,19 +4214,27 @@
   <p:clrMapOvr>
     <a:masterClrMapping/>
   </p:clrMapOvr>
+  <mc:AlternateContent xmlns:mc="http://schemas.openxmlformats.org/markup-compatibility/2006">
+    <mc:Choice xmlns:p14="http://schemas.microsoft.com/office/powerpoint/2010/main" Requires="p14">
+      <p:transition p14:dur="2000" advClick="1"/>
+    </mc:Choice>
+    <mc:Fallback>
+      <p:transition advClick="1"/>
+    </mc:Fallback>
+  </mc:AlternateContent>
 </p:sld>
 </file>
 
 <file path=ppt/slides/slide2.xml><?xml version="1.0" encoding="utf-8"?>
-<p:sld xmlns:a="http://schemas.openxmlformats.org/drawingml/2006/main" xmlns:r="http://schemas.openxmlformats.org/officeDocument/2006/relationships" xmlns:p="http://schemas.openxmlformats.org/presentationml/2006/main">
-  <p:cSld>
+<p:sld xmlns:a="http://schemas.openxmlformats.org/drawingml/2006/main" xmlns:r="http://schemas.openxmlformats.org/officeDocument/2006/relationships" xmlns:p="http://schemas.openxmlformats.org/presentationml/2006/main" xmlns:m="http://schemas.openxmlformats.org/officeDocument/2006/math" xmlns:w="http://schemas.openxmlformats.org/wordprocessingml/2006/main" showMasterPhAnim="0" show="1">
+  <p:cSld name="">
     <p:spTree>
       <p:nvGrpSpPr>
-        <p:cNvPr id="1" name=""/>
+        <p:cNvPr id="1" name="" hidden="0"/>
         <p:cNvGrpSpPr/>
-        <p:nvPr/>
+        <p:nvPr isPhoto="0" userDrawn="0"/>
       </p:nvGrpSpPr>
-      <p:grpSpPr>
+      <p:grpSpPr bwMode="auto">
         <a:xfrm>
           <a:off x="0" y="0"/>
           <a:ext cx="0" cy="0"/>
@@ -4257,136 +4244,211 @@
       </p:grpSpPr>
       <p:sp>
         <p:nvSpPr>
-          <p:cNvPr id="2" name="Título 1">
-            <a:extLst>
-              <a:ext uri="{FF2B5EF4-FFF2-40B4-BE49-F238E27FC236}">
-                <a16:creationId xmlns:a16="http://schemas.microsoft.com/office/drawing/2014/main" id="{834A517C-04C5-FAB3-9E54-920565ADB954}"/>
-              </a:ext>
-            </a:extLst>
-          </p:cNvPr>
-          <p:cNvSpPr>
-            <a:spLocks noGrp="1"/>
-          </p:cNvSpPr>
-          <p:nvPr>
-            <p:ph type="title"/>
-          </p:nvPr>
-        </p:nvSpPr>
-        <p:spPr/>
+          <p:cNvPr id="2" name="Título 1" hidden="0"/>
+          <p:cNvSpPr>
+            <a:spLocks noGrp="1"/>
+          </p:cNvSpPr>
+          <p:nvPr isPhoto="0" userDrawn="0">
+            <p:ph type="title" hasCustomPrompt="0"/>
+          </p:nvPr>
+        </p:nvSpPr>
+        <p:spPr bwMode="auto"/>
         <p:txBody>
           <a:bodyPr/>
           <a:lstStyle/>
           <a:p>
-            <a:r>
-              <a:rPr lang="pt-PT" dirty="0" err="1"/>
+            <a:pPr>
+              <a:defRPr/>
+            </a:pPr>
+            <a:r>
+              <a:rPr lang="pt-PT"/>
               <a:t>Specification</a:t>
             </a:r>
-          </a:p>
-        </p:txBody>
-      </p:sp>
-      <p:sp>
-        <p:nvSpPr>
-          <p:cNvPr id="3" name="Marcador de Posição de Conteúdo 2">
-            <a:extLst>
-              <a:ext uri="{FF2B5EF4-FFF2-40B4-BE49-F238E27FC236}">
-                <a16:creationId xmlns:a16="http://schemas.microsoft.com/office/drawing/2014/main" id="{0B9A9D25-FF8D-4FEB-BC9E-3217E59B6035}"/>
-              </a:ext>
-            </a:extLst>
-          </p:cNvPr>
-          <p:cNvSpPr>
-            <a:spLocks noGrp="1"/>
-          </p:cNvSpPr>
-          <p:nvPr>
-            <p:ph idx="1"/>
-          </p:nvPr>
-        </p:nvSpPr>
-        <p:spPr>
+            <a:endParaRPr/>
+          </a:p>
+        </p:txBody>
+      </p:sp>
+      <p:sp>
+        <p:nvSpPr>
+          <p:cNvPr id="3" name="Marcador de Posição de Conteúdo 2" hidden="0"/>
+          <p:cNvSpPr>
+            <a:spLocks noGrp="1"/>
+          </p:cNvSpPr>
+          <p:nvPr isPhoto="0" userDrawn="0">
+            <p:ph idx="1" hasCustomPrompt="0"/>
+          </p:nvPr>
+        </p:nvSpPr>
+        <p:spPr bwMode="auto">
           <a:xfrm>
             <a:off x="321325" y="2175831"/>
             <a:ext cx="10668000" cy="3818083"/>
           </a:xfrm>
         </p:spPr>
         <p:txBody>
-          <a:bodyPr vert="horz" lIns="91440" tIns="45720" rIns="91440" bIns="45720" rtlCol="0" anchor="t">
-            <a:normAutofit lnSpcReduction="10000"/>
+          <a:bodyPr vertOverflow="overflow" horzOverflow="clip" vert="horz" wrap="square" lIns="91440" tIns="45720" rIns="91440" bIns="45720" numCol="1" spcCol="0" rtlCol="0" fromWordArt="0" anchor="t" anchorCtr="0" forceAA="0" upright="0" compatLnSpc="0">
+            <a:normAutofit fontScale="65000" lnSpcReduction="7000"/>
           </a:bodyPr>
           <a:lstStyle/>
           <a:p>
-            <a:r>
-              <a:rPr lang="en-GB" dirty="0">
+            <a:pPr>
+              <a:defRPr/>
+            </a:pPr>
+            <a:r>
+              <a:rPr lang="en-GB" sz="2800" b="0" i="0" u="none" strike="noStrike" cap="none" spc="0">
                 <a:solidFill>
-                  <a:srgbClr val="FFFFFF">
+                  <a:schemeClr val="tx1">
                     <a:alpha val="70000"/>
-                  </a:srgbClr>
+                  </a:schemeClr>
                 </a:solidFill>
+                <a:latin typeface="+mn-lt"/>
+                <a:ea typeface="Avenir Next LT Pro"/>
+                <a:cs typeface="Avenir Next LT Pro"/>
               </a:rPr>
-              <a:t>It is important for a company to</a:t>
-            </a:r>
-            <a:r>
-              <a:rPr lang="en-GB" dirty="0">
-                <a:ea typeface="+mn-lt"/>
-                <a:cs typeface="+mn-lt"/>
-              </a:rPr>
-              <a:t> retain customers in order to maintain or even increase profit, so it might be very useful to predict their behaviour.</a:t>
-            </a:r>
-            <a:endParaRPr lang="en-GB" dirty="0">
+              <a:t>It is important for a company to retain customers in order to maintain or even increase profit, so it might be very useful to predict their behaviour. To do that we need to make a market research to answer some questions.</a:t>
+            </a:r>
+            <a:endParaRPr sz="2800">
               <a:solidFill>
                 <a:srgbClr val="FFFFFF">
                   <a:alpha val="70000"/>
                 </a:srgbClr>
               </a:solidFill>
-              <a:ea typeface="+mn-lt"/>
-              <a:cs typeface="+mn-lt"/>
+              <a:ea typeface="Avenir Next LT Pro"/>
+              <a:cs typeface="Avenir Next LT Pro"/>
             </a:endParaRPr>
           </a:p>
           <a:p>
-            <a:r>
-              <a:rPr lang="en-GB" dirty="0">
+            <a:pPr>
+              <a:defRPr/>
+            </a:pPr>
+            <a:r>
+              <a:rPr lang="en-GB" sz="2800" b="0" i="0" u="none" strike="noStrike" cap="none" spc="0">
                 <a:solidFill>
-                  <a:srgbClr val="FFFFFF">
+                  <a:schemeClr val="tx1">
                     <a:alpha val="70000"/>
-                  </a:srgbClr>
+                  </a:schemeClr>
                 </a:solidFill>
+                <a:latin typeface="+mn-lt"/>
+                <a:ea typeface="Avenir Next LT Pro"/>
+                <a:cs typeface="Avenir Next LT Pro"/>
               </a:rPr>
-              <a:t>So, given a dataset with information about telco customers we want to predict if a customer will churn or not.</a:t>
-            </a:r>
-          </a:p>
-          <a:p>
-            <a:r>
-              <a:rPr lang="en-GB" dirty="0">
+              <a:t>So, given a dataset with information about telco customers we want to predict if a customer will churn or not, according to the percentage of churn in the dataset and if that number is affected by any other variable such as gender, services subscribed or even the charges of the customer.</a:t>
+            </a:r>
+            <a:endParaRPr sz="2800">
+              <a:solidFill>
+                <a:srgbClr val="FFFFFF">
+                  <a:alpha val="70000"/>
+                </a:srgbClr>
+              </a:solidFill>
+              <a:ea typeface="Avenir Next LT Pro"/>
+              <a:cs typeface="Avenir Next LT Pro"/>
+            </a:endParaRPr>
+          </a:p>
+          <a:p>
+            <a:pPr>
+              <a:defRPr/>
+            </a:pPr>
+            <a:r>
+              <a:rPr lang="en-GB" sz="2800" b="0" i="0" u="none" strike="noStrike" cap="none" spc="0">
                 <a:solidFill>
-                  <a:srgbClr val="FFFFFF">
+                  <a:schemeClr val="tx1">
                     <a:alpha val="70000"/>
-                  </a:srgbClr>
+                  </a:schemeClr>
                 </a:solidFill>
+                <a:latin typeface="+mn-lt"/>
+                <a:ea typeface="Avenir Next LT Pro"/>
+                <a:cs typeface="Avenir Next LT Pro"/>
               </a:rPr>
-              <a:t>In other words the main goal of this project is to predict if a customer will stop buying products/services in telco.</a:t>
-            </a:r>
+              <a:t>Other important analysis for the company are the profit evaluation such as the most profitable service or feature and the ones not sot profitable.</a:t>
+            </a:r>
+            <a:endParaRPr sz="2800">
+              <a:solidFill>
+                <a:srgbClr val="FFFFFF">
+                  <a:alpha val="70000"/>
+                </a:srgbClr>
+              </a:solidFill>
+            </a:endParaRPr>
+          </a:p>
+          <a:p>
+            <a:pPr>
+              <a:defRPr/>
+            </a:pPr>
+            <a:r>
+              <a:rPr lang="en-GB" sz="2800" b="0" i="0" u="none" strike="noStrike" cap="none" spc="0">
+                <a:solidFill>
+                  <a:schemeClr val="tx1">
+                    <a:alpha val="70000"/>
+                  </a:schemeClr>
+                </a:solidFill>
+                <a:latin typeface="+mn-lt"/>
+                <a:ea typeface="Avenir Next LT Pro"/>
+                <a:cs typeface="Avenir Next LT Pro"/>
+              </a:rPr>
+              <a:t>All of this questions/doubts should be after the study of the dataset and </a:t>
+            </a:r>
+            <a:r>
+              <a:rPr lang="en-GB" sz="2800" b="0" i="0" u="none" strike="noStrike" cap="none" spc="0">
+                <a:solidFill>
+                  <a:schemeClr val="tx1">
+                    <a:alpha val="70000"/>
+                  </a:schemeClr>
+                </a:solidFill>
+                <a:latin typeface="+mn-lt"/>
+                <a:ea typeface="Avenir Next LT Pro"/>
+                <a:cs typeface="Avenir Next LT Pro"/>
+              </a:rPr>
+              <a:t>that'ś</a:t>
+            </a:r>
+            <a:r>
+              <a:rPr lang="en-GB" sz="2800" b="0" i="0" u="none" strike="noStrike" cap="none" spc="0">
+                <a:solidFill>
+                  <a:schemeClr val="tx1">
+                    <a:alpha val="70000"/>
+                  </a:schemeClr>
+                </a:solidFill>
+                <a:latin typeface="+mn-lt"/>
+                <a:ea typeface="Avenir Next LT Pro"/>
+                <a:cs typeface="Avenir Next LT Pro"/>
+              </a:rPr>
+              <a:t> the main goal of this project.</a:t>
+            </a:r>
+            <a:endParaRPr sz="2800">
+              <a:solidFill>
+                <a:srgbClr val="FFFFFF">
+                  <a:alpha val="70000"/>
+                </a:srgbClr>
+              </a:solidFill>
+              <a:ea typeface="Avenir Next LT Pro"/>
+              <a:cs typeface="Avenir Next LT Pro"/>
+            </a:endParaRPr>
           </a:p>
         </p:txBody>
       </p:sp>
     </p:spTree>
-    <p:extLst>
-      <p:ext uri="{BB962C8B-B14F-4D97-AF65-F5344CB8AC3E}">
-        <p14:creationId xmlns:p14="http://schemas.microsoft.com/office/powerpoint/2010/main" val="710486550"/>
-      </p:ext>
-    </p:extLst>
   </p:cSld>
   <p:clrMapOvr>
     <a:masterClrMapping/>
   </p:clrMapOvr>
+  <mc:AlternateContent xmlns:mc="http://schemas.openxmlformats.org/markup-compatibility/2006">
+    <mc:Choice xmlns:p14="http://schemas.microsoft.com/office/powerpoint/2010/main" Requires="p14">
+      <p:transition p14:dur="2000" advClick="1"/>
+    </mc:Choice>
+    <mc:Fallback>
+      <p:transition advClick="1"/>
+    </mc:Fallback>
+  </mc:AlternateContent>
 </p:sld>
 </file>
 
 <file path=ppt/slides/slide3.xml><?xml version="1.0" encoding="utf-8"?>
-<p:sld xmlns:a="http://schemas.openxmlformats.org/drawingml/2006/main" xmlns:r="http://schemas.openxmlformats.org/officeDocument/2006/relationships" xmlns:p="http://schemas.openxmlformats.org/presentationml/2006/main">
-  <p:cSld>
+<p:sld xmlns:a="http://schemas.openxmlformats.org/drawingml/2006/main" xmlns:r="http://schemas.openxmlformats.org/officeDocument/2006/relationships" xmlns:p="http://schemas.openxmlformats.org/presentationml/2006/main" xmlns:m="http://schemas.openxmlformats.org/officeDocument/2006/math" xmlns:w="http://schemas.openxmlformats.org/wordprocessingml/2006/main" showMasterPhAnim="0" show="1">
+  <p:cSld name="">
     <p:spTree>
       <p:nvGrpSpPr>
-        <p:cNvPr id="1" name=""/>
+        <p:cNvPr id="1" name="" hidden="0"/>
         <p:cNvGrpSpPr/>
-        <p:nvPr/>
+        <p:nvPr isPhoto="0" userDrawn="0"/>
       </p:nvGrpSpPr>
-      <p:grpSpPr>
+      <p:grpSpPr bwMode="auto">
         <a:xfrm>
           <a:off x="0" y="0"/>
           <a:ext cx="0" cy="0"/>
@@ -4396,110 +4458,112 @@
       </p:grpSpPr>
       <p:sp>
         <p:nvSpPr>
-          <p:cNvPr id="2" name="Título 1">
-            <a:extLst>
-              <a:ext uri="{FF2B5EF4-FFF2-40B4-BE49-F238E27FC236}">
-                <a16:creationId xmlns:a16="http://schemas.microsoft.com/office/drawing/2014/main" id="{E92206F5-7100-0F38-270D-C45005FB9475}"/>
-              </a:ext>
-            </a:extLst>
-          </p:cNvPr>
-          <p:cNvSpPr>
-            <a:spLocks noGrp="1"/>
-          </p:cNvSpPr>
-          <p:nvPr>
-            <p:ph type="title"/>
-          </p:nvPr>
-        </p:nvSpPr>
-        <p:spPr/>
+          <p:cNvPr id="2" name="Título 1" hidden="0"/>
+          <p:cNvSpPr>
+            <a:spLocks noGrp="1"/>
+          </p:cNvSpPr>
+          <p:nvPr isPhoto="0" userDrawn="0">
+            <p:ph type="title" hasCustomPrompt="0"/>
+          </p:nvPr>
+        </p:nvSpPr>
+        <p:spPr bwMode="auto"/>
         <p:txBody>
           <a:bodyPr/>
           <a:lstStyle/>
           <a:p>
-            <a:r>
-              <a:rPr lang="pt-PT" dirty="0" err="1"/>
+            <a:pPr>
+              <a:defRPr/>
+            </a:pPr>
+            <a:r>
+              <a:rPr lang="pt-PT"/>
               <a:t>Related</a:t>
             </a:r>
             <a:r>
-              <a:rPr lang="pt-PT" dirty="0"/>
+              <a:rPr lang="pt-PT"/>
               <a:t> </a:t>
             </a:r>
             <a:r>
-              <a:rPr lang="pt-PT" dirty="0" err="1"/>
+              <a:rPr lang="pt-PT"/>
               <a:t>Work</a:t>
             </a:r>
-          </a:p>
-        </p:txBody>
-      </p:sp>
-      <p:sp>
-        <p:nvSpPr>
-          <p:cNvPr id="3" name="Marcador de Posição de Conteúdo 2">
-            <a:extLst>
-              <a:ext uri="{FF2B5EF4-FFF2-40B4-BE49-F238E27FC236}">
-                <a16:creationId xmlns:a16="http://schemas.microsoft.com/office/drawing/2014/main" id="{E3E76583-54EE-9690-8E5E-37B1DD1DD744}"/>
-              </a:ext>
-            </a:extLst>
-          </p:cNvPr>
-          <p:cNvSpPr>
-            <a:spLocks noGrp="1"/>
-          </p:cNvSpPr>
-          <p:nvPr>
-            <p:ph idx="1"/>
-          </p:nvPr>
-        </p:nvSpPr>
-        <p:spPr/>
+            <a:endParaRPr/>
+          </a:p>
+        </p:txBody>
+      </p:sp>
+      <p:sp>
+        <p:nvSpPr>
+          <p:cNvPr id="3" name="Marcador de Posição de Conteúdo 2" hidden="0"/>
+          <p:cNvSpPr>
+            <a:spLocks noGrp="1"/>
+          </p:cNvSpPr>
+          <p:nvPr isPhoto="0" userDrawn="0">
+            <p:ph idx="1" hasCustomPrompt="0"/>
+          </p:nvPr>
+        </p:nvSpPr>
+        <p:spPr bwMode="auto"/>
         <p:txBody>
           <a:bodyPr vert="horz" lIns="91440" tIns="45720" rIns="91440" bIns="45720" rtlCol="0" anchor="t">
             <a:normAutofit/>
           </a:bodyPr>
           <a:lstStyle/>
           <a:p>
-            <a:r>
-              <a:rPr lang="pt-PT" u="sng" dirty="0">
+            <a:pPr>
+              <a:defRPr/>
+            </a:pPr>
+            <a:r>
+              <a:rPr lang="pt-PT" u="sng">
                 <a:ea typeface="+mn-lt"/>
                 <a:cs typeface="+mn-lt"/>
-                <a:hlinkClick r:id="rId2"/>
+                <a:hlinkClick r:id="rId2" tooltip="https://moodle.up.pt/"/>
               </a:rPr>
               <a:t>https://moodle.up.pt/</a:t>
             </a:r>
             <a:r>
-              <a:rPr lang="pt-PT" dirty="0">
+              <a:rPr lang="pt-PT">
                 <a:ea typeface="+mn-lt"/>
                 <a:cs typeface="+mn-lt"/>
               </a:rPr>
               <a:t> (</a:t>
             </a:r>
             <a:r>
-              <a:rPr lang="pt-PT" dirty="0" err="1">
+              <a:rPr lang="pt-PT">
                 <a:ea typeface="+mn-lt"/>
                 <a:cs typeface="+mn-lt"/>
               </a:rPr>
               <a:t>course</a:t>
             </a:r>
             <a:r>
-              <a:rPr lang="pt-PT" dirty="0">
+              <a:rPr lang="pt-PT">
                 <a:ea typeface="+mn-lt"/>
                 <a:cs typeface="+mn-lt"/>
               </a:rPr>
               <a:t> files)</a:t>
             </a:r>
-          </a:p>
-          <a:p>
-            <a:r>
-              <a:rPr lang="pt-PT" dirty="0">
+            <a:endParaRPr/>
+          </a:p>
+          <a:p>
+            <a:pPr>
+              <a:defRPr/>
+            </a:pPr>
+            <a:r>
+              <a:rPr lang="pt-PT" u="sng">
                 <a:ea typeface="+mn-lt"/>
                 <a:cs typeface="+mn-lt"/>
-                <a:hlinkClick r:id="rId3"/>
+                <a:hlinkClick r:id="rId3" tooltip="https://www.kaggle.com/datasets/easonlai/sample-telco-customer-churn-dataset"/>
               </a:rPr>
               <a:t>https://www.kaggle.com/datasets/easonlai/sample-telco-customer-churn-dataset</a:t>
             </a:r>
-            <a:endParaRPr lang="pt-PT" dirty="0">
+            <a:endParaRPr lang="pt-PT">
               <a:ea typeface="+mn-lt"/>
               <a:cs typeface="+mn-lt"/>
             </a:endParaRPr>
           </a:p>
           <a:p>
-            <a:r>
-              <a:rPr lang="pt-PT" dirty="0">
+            <a:pPr>
+              <a:defRPr/>
+            </a:pPr>
+            <a:r>
+              <a:rPr lang="pt-PT" u="sng">
                 <a:solidFill>
                   <a:srgbClr val="FFFFFF">
                     <a:alpha val="70000"/>
@@ -4507,11 +4571,11 @@
                 </a:solidFill>
                 <a:ea typeface="+mn-lt"/>
                 <a:cs typeface="Arial"/>
-                <a:hlinkClick r:id="rId4"/>
+                <a:hlinkClick r:id="rId4" tooltip="https://www.kaggle.com/datasets/blastchar/telco-customer-churn"/>
               </a:rPr>
               <a:t>https://www.kaggle.com/datasets/blastchar/telco-customer-churn</a:t>
             </a:r>
-            <a:endParaRPr lang="pt-PT" dirty="0">
+            <a:endParaRPr lang="pt-PT">
               <a:solidFill>
                 <a:srgbClr val="FFFFFF">
                   <a:alpha val="70000"/>
@@ -4522,7 +4586,10 @@
             </a:endParaRPr>
           </a:p>
           <a:p>
-            <a:endParaRPr lang="pt-PT" dirty="0">
+            <a:pPr>
+              <a:defRPr/>
+            </a:pPr>
+            <a:endParaRPr lang="pt-PT">
               <a:solidFill>
                 <a:srgbClr val="FFFFFF">
                   <a:alpha val="70000"/>
@@ -4533,28 +4600,31 @@
         </p:txBody>
       </p:sp>
     </p:spTree>
-    <p:extLst>
-      <p:ext uri="{BB962C8B-B14F-4D97-AF65-F5344CB8AC3E}">
-        <p14:creationId xmlns:p14="http://schemas.microsoft.com/office/powerpoint/2010/main" val="985761188"/>
-      </p:ext>
-    </p:extLst>
   </p:cSld>
   <p:clrMapOvr>
     <a:masterClrMapping/>
   </p:clrMapOvr>
+  <mc:AlternateContent xmlns:mc="http://schemas.openxmlformats.org/markup-compatibility/2006">
+    <mc:Choice xmlns:p14="http://schemas.microsoft.com/office/powerpoint/2010/main" Requires="p14">
+      <p:transition p14:dur="2000" advClick="1"/>
+    </mc:Choice>
+    <mc:Fallback>
+      <p:transition advClick="1"/>
+    </mc:Fallback>
+  </mc:AlternateContent>
 </p:sld>
 </file>
 
 <file path=ppt/slides/slide4.xml><?xml version="1.0" encoding="utf-8"?>
-<p:sld xmlns:a="http://schemas.openxmlformats.org/drawingml/2006/main" xmlns:r="http://schemas.openxmlformats.org/officeDocument/2006/relationships" xmlns:p="http://schemas.openxmlformats.org/presentationml/2006/main">
-  <p:cSld>
+<p:sld xmlns:a="http://schemas.openxmlformats.org/drawingml/2006/main" xmlns:r="http://schemas.openxmlformats.org/officeDocument/2006/relationships" xmlns:p="http://schemas.openxmlformats.org/presentationml/2006/main" xmlns:m="http://schemas.openxmlformats.org/officeDocument/2006/math" xmlns:w="http://schemas.openxmlformats.org/wordprocessingml/2006/main" showMasterPhAnim="0" show="1">
+  <p:cSld name="">
     <p:spTree>
       <p:nvGrpSpPr>
-        <p:cNvPr id="1" name=""/>
+        <p:cNvPr id="1" name="" hidden="0"/>
         <p:cNvGrpSpPr/>
-        <p:nvPr/>
+        <p:nvPr isPhoto="0" userDrawn="0"/>
       </p:nvGrpSpPr>
-      <p:grpSpPr>
+      <p:grpSpPr bwMode="auto">
         <a:xfrm>
           <a:off x="0" y="0"/>
           <a:ext cx="0" cy="0"/>
@@ -4564,82 +4634,80 @@
       </p:grpSpPr>
       <p:sp>
         <p:nvSpPr>
-          <p:cNvPr id="2" name="Título 1">
-            <a:extLst>
-              <a:ext uri="{FF2B5EF4-FFF2-40B4-BE49-F238E27FC236}">
-                <a16:creationId xmlns:a16="http://schemas.microsoft.com/office/drawing/2014/main" id="{7A612364-CBC2-0E41-52C6-B935CF6DEA67}"/>
-              </a:ext>
-            </a:extLst>
-          </p:cNvPr>
-          <p:cNvSpPr>
-            <a:spLocks noGrp="1"/>
-          </p:cNvSpPr>
-          <p:nvPr>
-            <p:ph type="title"/>
-          </p:nvPr>
-        </p:nvSpPr>
-        <p:spPr/>
+          <p:cNvPr id="2" name="Título 1" hidden="0"/>
+          <p:cNvSpPr>
+            <a:spLocks noGrp="1"/>
+          </p:cNvSpPr>
+          <p:nvPr isPhoto="0" userDrawn="0">
+            <p:ph type="title" hasCustomPrompt="0"/>
+          </p:nvPr>
+        </p:nvSpPr>
+        <p:spPr bwMode="auto"/>
         <p:txBody>
           <a:bodyPr/>
           <a:lstStyle/>
           <a:p>
-            <a:r>
-              <a:rPr lang="pt-PT" dirty="0" err="1"/>
+            <a:pPr>
+              <a:defRPr/>
+            </a:pPr>
+            <a:r>
+              <a:rPr lang="pt-PT"/>
               <a:t>Tools</a:t>
             </a:r>
             <a:r>
-              <a:rPr lang="pt-PT" dirty="0"/>
+              <a:rPr lang="pt-PT"/>
               <a:t> </a:t>
             </a:r>
             <a:r>
-              <a:rPr lang="pt-PT" dirty="0" err="1"/>
+              <a:rPr lang="pt-PT"/>
               <a:t>and</a:t>
             </a:r>
             <a:r>
-              <a:rPr lang="pt-PT" dirty="0"/>
+              <a:rPr lang="pt-PT"/>
               <a:t> </a:t>
             </a:r>
             <a:r>
-              <a:rPr lang="pt-PT" dirty="0" err="1"/>
+              <a:rPr lang="pt-PT"/>
               <a:t>algorithms</a:t>
             </a:r>
-          </a:p>
-        </p:txBody>
-      </p:sp>
-      <p:sp>
-        <p:nvSpPr>
-          <p:cNvPr id="3" name="Marcador de Posição de Conteúdo 2">
-            <a:extLst>
-              <a:ext uri="{FF2B5EF4-FFF2-40B4-BE49-F238E27FC236}">
-                <a16:creationId xmlns:a16="http://schemas.microsoft.com/office/drawing/2014/main" id="{B0EFEDED-1772-89D4-DD92-D7BEE7EE0612}"/>
-              </a:ext>
-            </a:extLst>
-          </p:cNvPr>
-          <p:cNvSpPr>
-            <a:spLocks noGrp="1"/>
-          </p:cNvSpPr>
-          <p:nvPr>
-            <p:ph idx="1"/>
-          </p:nvPr>
-        </p:nvSpPr>
-        <p:spPr/>
-        <p:txBody>
-          <a:bodyPr vert="horz" lIns="91440" tIns="45720" rIns="91440" bIns="45720" rtlCol="0" anchor="t">
-            <a:normAutofit fontScale="62500" lnSpcReduction="20000"/>
+            <a:endParaRPr/>
+          </a:p>
+        </p:txBody>
+      </p:sp>
+      <p:sp>
+        <p:nvSpPr>
+          <p:cNvPr id="3" name="Marcador de Posição de Conteúdo 2" hidden="0"/>
+          <p:cNvSpPr>
+            <a:spLocks noGrp="1"/>
+          </p:cNvSpPr>
+          <p:nvPr isPhoto="0" userDrawn="0">
+            <p:ph idx="1" hasCustomPrompt="0"/>
+          </p:nvPr>
+        </p:nvSpPr>
+        <p:spPr bwMode="auto"/>
+        <p:txBody>
+          <a:bodyPr vertOverflow="overflow" horzOverflow="clip" vert="horz" wrap="square" lIns="91440" tIns="45720" rIns="91440" bIns="45720" numCol="1" spcCol="0" rtlCol="0" fromWordArt="0" anchor="t" anchorCtr="0" forceAA="0" upright="0" compatLnSpc="0">
+            <a:normAutofit fontScale="50000" lnSpcReduction="10000"/>
           </a:bodyPr>
           <a:lstStyle/>
           <a:p>
-            <a:r>
-              <a:rPr lang="en-GB" dirty="0">
+            <a:pPr>
+              <a:defRPr/>
+            </a:pPr>
+            <a:r>
+              <a:rPr lang="en-GB" sz="2800" b="0" i="0" u="none" strike="noStrike" cap="none" spc="0">
                 <a:solidFill>
                   <a:srgbClr val="FFFFFF">
                     <a:alpha val="70000"/>
                   </a:srgbClr>
                 </a:solidFill>
+                <a:latin typeface="+mn-lt"/>
+                <a:ea typeface="+mn-ea"/>
+                <a:cs typeface="+mn-cs"/>
               </a:rPr>
               <a:t>For this assignment we will use some python tools and libraries also used in classes which are:</a:t>
             </a:r>
-            <a:endParaRPr lang="pt-PT" dirty="0">
+            <a:endParaRPr sz="2800">
               <a:solidFill>
                 <a:srgbClr val="FFFFFF">
                   <a:alpha val="70000"/>
@@ -4648,221 +4716,354 @@
             </a:endParaRPr>
           </a:p>
           <a:p>
-            <a:r>
-              <a:rPr lang="en-GB" dirty="0">
+            <a:pPr>
+              <a:defRPr/>
+            </a:pPr>
+            <a:r>
+              <a:rPr lang="en-GB" sz="2800" b="0" i="0" u="none" strike="noStrike" cap="none" spc="0">
                 <a:solidFill>
                   <a:srgbClr val="FFFFFF">
                     <a:alpha val="70000"/>
                   </a:srgbClr>
                 </a:solidFill>
+                <a:latin typeface="+mn-lt"/>
+                <a:ea typeface="+mn-ea"/>
+                <a:cs typeface="+mn-cs"/>
               </a:rPr>
               <a:t>- </a:t>
             </a:r>
             <a:r>
-              <a:rPr lang="en-GB" dirty="0" err="1">
+              <a:rPr lang="en-GB" sz="2800" b="0" i="0" u="none" strike="noStrike" cap="none" spc="0">
                 <a:solidFill>
                   <a:srgbClr val="FFFFFF">
                     <a:alpha val="70000"/>
                   </a:srgbClr>
                 </a:solidFill>
+                <a:latin typeface="+mn-lt"/>
+                <a:ea typeface="+mn-ea"/>
+                <a:cs typeface="+mn-cs"/>
               </a:rPr>
               <a:t>numpy</a:t>
             </a:r>
             <a:r>
-              <a:rPr lang="en-GB" dirty="0">
+              <a:rPr lang="en-GB" sz="2800" b="0" i="0" u="none" strike="noStrike" cap="none" spc="0">
                 <a:solidFill>
                   <a:srgbClr val="FFFFFF">
                     <a:alpha val="70000"/>
                   </a:srgbClr>
                 </a:solidFill>
+                <a:latin typeface="+mn-lt"/>
+                <a:ea typeface="+mn-ea"/>
+                <a:cs typeface="+mn-cs"/>
               </a:rPr>
               <a:t> (</a:t>
             </a:r>
             <a:r>
-              <a:rPr lang="en-GB" dirty="0">
-                <a:ea typeface="+mn-lt"/>
-                <a:cs typeface="+mn-lt"/>
+              <a:rPr lang="en-GB" sz="2800" b="0" i="0" u="none" strike="noStrike" cap="none" spc="0">
+                <a:solidFill>
+                  <a:schemeClr val="tx1">
+                    <a:alpha val="70000"/>
+                  </a:schemeClr>
+                </a:solidFill>
+                <a:latin typeface="+mn-lt"/>
+                <a:ea typeface="Avenir Next LT Pro"/>
+                <a:cs typeface="Avenir Next LT Pro"/>
               </a:rPr>
               <a:t>library used for working with arrays</a:t>
             </a:r>
             <a:r>
-              <a:rPr lang="en-GB" dirty="0">
+              <a:rPr lang="en-GB" sz="2800" b="0" i="0" u="none" strike="noStrike" cap="none" spc="0">
                 <a:solidFill>
                   <a:srgbClr val="FFFFFF">
                     <a:alpha val="70000"/>
                   </a:srgbClr>
                 </a:solidFill>
+                <a:latin typeface="+mn-lt"/>
+                <a:ea typeface="+mn-ea"/>
+                <a:cs typeface="+mn-cs"/>
               </a:rPr>
               <a:t>);</a:t>
             </a:r>
-          </a:p>
-          <a:p>
-            <a:r>
-              <a:rPr lang="en-GB" dirty="0">
+            <a:endParaRPr sz="2800"/>
+          </a:p>
+          <a:p>
+            <a:pPr>
+              <a:defRPr/>
+            </a:pPr>
+            <a:r>
+              <a:rPr lang="en-GB" sz="2800" b="0" i="0" u="none" strike="noStrike" cap="none" spc="0">
                 <a:solidFill>
                   <a:srgbClr val="FFFFFF">
                     <a:alpha val="70000"/>
                   </a:srgbClr>
                 </a:solidFill>
+                <a:latin typeface="+mn-lt"/>
+                <a:ea typeface="+mn-ea"/>
+                <a:cs typeface="+mn-cs"/>
               </a:rPr>
               <a:t>- pandas (</a:t>
             </a:r>
             <a:r>
-              <a:rPr lang="en-GB" dirty="0">
-                <a:ea typeface="+mn-lt"/>
-                <a:cs typeface="+mn-lt"/>
+              <a:rPr lang="en-GB" sz="2800" b="0" i="0" u="none" strike="noStrike" cap="none" spc="0">
+                <a:solidFill>
+                  <a:schemeClr val="tx1">
+                    <a:alpha val="70000"/>
+                  </a:schemeClr>
+                </a:solidFill>
+                <a:latin typeface="+mn-lt"/>
+                <a:ea typeface="Avenir Next LT Pro"/>
+                <a:cs typeface="Avenir Next LT Pro"/>
               </a:rPr>
               <a:t>data science/data analysis and machine learning tasks</a:t>
             </a:r>
             <a:r>
-              <a:rPr lang="en-GB" dirty="0">
+              <a:rPr lang="en-GB" sz="2800" b="0" i="0" u="none" strike="noStrike" cap="none" spc="0">
                 <a:solidFill>
                   <a:srgbClr val="FFFFFF">
                     <a:alpha val="70000"/>
                   </a:srgbClr>
                 </a:solidFill>
+                <a:latin typeface="+mn-lt"/>
+                <a:ea typeface="+mn-ea"/>
+                <a:cs typeface="+mn-cs"/>
               </a:rPr>
               <a:t>);</a:t>
             </a:r>
-          </a:p>
-          <a:p>
-            <a:r>
-              <a:rPr lang="en-GB" dirty="0">
+            <a:endParaRPr sz="2800"/>
+          </a:p>
+          <a:p>
+            <a:pPr>
+              <a:defRPr/>
+            </a:pPr>
+            <a:r>
+              <a:rPr lang="en-GB" sz="2800" b="0" i="0" u="none" strike="noStrike" cap="none" spc="0">
                 <a:solidFill>
                   <a:srgbClr val="FFFFFF">
                     <a:alpha val="70000"/>
                   </a:srgbClr>
                 </a:solidFill>
+                <a:latin typeface="+mn-lt"/>
+                <a:ea typeface="+mn-ea"/>
+                <a:cs typeface="+mn-cs"/>
               </a:rPr>
               <a:t>- scikit-learn (</a:t>
             </a:r>
             <a:r>
-              <a:rPr lang="en-GB" dirty="0">
-                <a:ea typeface="+mn-lt"/>
-                <a:cs typeface="+mn-lt"/>
+              <a:rPr lang="en-GB" sz="2800" b="0" i="0" u="none" strike="noStrike" cap="none" spc="0">
+                <a:solidFill>
+                  <a:schemeClr val="tx1">
+                    <a:alpha val="70000"/>
+                  </a:schemeClr>
+                </a:solidFill>
+                <a:latin typeface="+mn-lt"/>
+                <a:ea typeface="Avenir Next LT Pro"/>
+                <a:cs typeface="Avenir Next LT Pro"/>
               </a:rPr>
               <a:t>machine learning and statistical </a:t>
             </a:r>
             <a:r>
-              <a:rPr lang="en-GB" dirty="0" err="1">
-                <a:ea typeface="+mn-lt"/>
-                <a:cs typeface="+mn-lt"/>
+              <a:rPr lang="en-GB" sz="2800" b="0" i="0" u="none" strike="noStrike" cap="none" spc="0">
+                <a:solidFill>
+                  <a:schemeClr val="tx1">
+                    <a:alpha val="70000"/>
+                  </a:schemeClr>
+                </a:solidFill>
+                <a:latin typeface="+mn-lt"/>
+                <a:ea typeface="Avenir Next LT Pro"/>
+                <a:cs typeface="Avenir Next LT Pro"/>
               </a:rPr>
               <a:t>modeling</a:t>
             </a:r>
             <a:r>
-              <a:rPr lang="en-GB" dirty="0">
-                <a:ea typeface="+mn-lt"/>
-                <a:cs typeface="+mn-lt"/>
+              <a:rPr lang="en-GB" sz="2800" b="0" i="0" u="none" strike="noStrike" cap="none" spc="0">
+                <a:solidFill>
+                  <a:schemeClr val="tx1">
+                    <a:alpha val="70000"/>
+                  </a:schemeClr>
+                </a:solidFill>
+                <a:latin typeface="+mn-lt"/>
+                <a:ea typeface="Avenir Next LT Pro"/>
+                <a:cs typeface="Avenir Next LT Pro"/>
               </a:rPr>
               <a:t> including classification, regression, clustering and dimensionality reduction</a:t>
             </a:r>
             <a:r>
-              <a:rPr lang="en-GB" dirty="0">
+              <a:rPr lang="en-GB" sz="2800" b="0" i="0" u="none" strike="noStrike" cap="none" spc="0">
                 <a:solidFill>
                   <a:srgbClr val="FFFFFF">
                     <a:alpha val="70000"/>
                   </a:srgbClr>
                 </a:solidFill>
+                <a:latin typeface="+mn-lt"/>
+                <a:ea typeface="+mn-ea"/>
+                <a:cs typeface="+mn-cs"/>
               </a:rPr>
               <a:t>); </a:t>
             </a:r>
-          </a:p>
-          <a:p>
-            <a:r>
-              <a:rPr lang="en-GB" dirty="0">
+            <a:endParaRPr sz="2800"/>
+          </a:p>
+          <a:p>
+            <a:pPr>
+              <a:defRPr/>
+            </a:pPr>
+            <a:r>
+              <a:rPr lang="en-GB" sz="2800" b="0" i="0" u="none" strike="noStrike" cap="none" spc="0">
                 <a:solidFill>
                   <a:srgbClr val="FFFFFF">
                     <a:alpha val="70000"/>
                   </a:srgbClr>
                 </a:solidFill>
+                <a:latin typeface="+mn-lt"/>
+                <a:ea typeface="+mn-ea"/>
+                <a:cs typeface="+mn-cs"/>
               </a:rPr>
               <a:t>- matplotlib (</a:t>
             </a:r>
             <a:r>
-              <a:rPr lang="en-GB" dirty="0">
-                <a:ea typeface="+mn-lt"/>
-                <a:cs typeface="+mn-lt"/>
+              <a:rPr lang="en-GB" sz="2800" b="0" i="0" u="none" strike="noStrike" cap="none" spc="0">
+                <a:solidFill>
+                  <a:schemeClr val="tx1">
+                    <a:alpha val="70000"/>
+                  </a:schemeClr>
+                </a:solidFill>
+                <a:latin typeface="+mn-lt"/>
+                <a:ea typeface="Avenir Next LT Pro"/>
+                <a:cs typeface="Avenir Next LT Pro"/>
               </a:rPr>
               <a:t>comprehensive library for creating static, animated, and interactive visualizations in Python</a:t>
             </a:r>
             <a:r>
-              <a:rPr lang="en-GB" dirty="0">
+              <a:rPr lang="en-GB" sz="2800" b="0" i="0" u="none" strike="noStrike" cap="none" spc="0">
                 <a:solidFill>
                   <a:srgbClr val="FFFFFF">
                     <a:alpha val="70000"/>
                   </a:srgbClr>
                 </a:solidFill>
+                <a:latin typeface="+mn-lt"/>
+                <a:ea typeface="+mn-ea"/>
+                <a:cs typeface="+mn-cs"/>
               </a:rPr>
               <a:t>);</a:t>
             </a:r>
-          </a:p>
-          <a:p>
-            <a:r>
-              <a:rPr lang="en-GB" dirty="0">
+            <a:endParaRPr sz="2800"/>
+          </a:p>
+          <a:p>
+            <a:pPr>
+              <a:defRPr/>
+            </a:pPr>
+            <a:r>
+              <a:rPr lang="en-GB" sz="2800" b="0" i="0" u="none" strike="noStrike" cap="none" spc="0">
                 <a:solidFill>
                   <a:srgbClr val="FFFFFF">
                     <a:alpha val="70000"/>
                   </a:srgbClr>
                 </a:solidFill>
+                <a:latin typeface="+mn-lt"/>
+                <a:ea typeface="+mn-ea"/>
+                <a:cs typeface="+mn-cs"/>
               </a:rPr>
               <a:t>- seaborn (</a:t>
             </a:r>
             <a:r>
-              <a:rPr lang="en-GB" dirty="0">
-                <a:ea typeface="+mn-lt"/>
-                <a:cs typeface="+mn-lt"/>
+              <a:rPr lang="en-GB" sz="2800" b="0" i="0" u="none" strike="noStrike" cap="none" spc="0">
+                <a:solidFill>
+                  <a:schemeClr val="tx1">
+                    <a:alpha val="70000"/>
+                  </a:schemeClr>
+                </a:solidFill>
+                <a:latin typeface="+mn-lt"/>
+                <a:ea typeface="Avenir Next LT Pro"/>
+                <a:cs typeface="Avenir Next LT Pro"/>
               </a:rPr>
               <a:t>uses Matplotlib underneath to plot graphs</a:t>
             </a:r>
             <a:r>
-              <a:rPr lang="en-GB" dirty="0">
+              <a:rPr lang="en-GB" sz="2800" b="0" i="0" u="none" strike="noStrike" cap="none" spc="0">
                 <a:solidFill>
                   <a:srgbClr val="FFFFFF">
                     <a:alpha val="70000"/>
                   </a:srgbClr>
                 </a:solidFill>
+                <a:latin typeface="+mn-lt"/>
+                <a:ea typeface="+mn-ea"/>
+                <a:cs typeface="+mn-cs"/>
               </a:rPr>
               <a:t>).</a:t>
             </a:r>
-          </a:p>
-          <a:p>
-            <a:r>
-              <a:rPr lang="en-GB" dirty="0">
+            <a:endParaRPr sz="2800">
+              <a:solidFill>
+                <a:srgbClr val="FFFFFF">
+                  <a:alpha val="70000"/>
+                </a:srgbClr>
+              </a:solidFill>
+            </a:endParaRPr>
+          </a:p>
+          <a:p>
+            <a:pPr>
+              <a:defRPr/>
+            </a:pPr>
+            <a:r>
+              <a:rPr lang="en-GB" sz="2800" b="0" i="0" u="none" strike="noStrike" cap="none" spc="0">
                 <a:solidFill>
                   <a:srgbClr val="FFFFFF">
                     <a:alpha val="70000"/>
                   </a:srgbClr>
                 </a:solidFill>
+                <a:latin typeface="+mn-lt"/>
+                <a:ea typeface="+mn-ea"/>
+                <a:cs typeface="+mn-cs"/>
+              </a:rPr>
+              <a:t>Our work will be developed in a python notebook- In our case Jupyter Notebook, so this packages come standard with the Anaconda python distribution.</a:t>
+            </a:r>
+            <a:endParaRPr sz="2800"/>
+          </a:p>
+          <a:p>
+            <a:pPr>
+              <a:defRPr/>
+            </a:pPr>
+            <a:r>
+              <a:rPr lang="en-GB" sz="2800" b="0" i="0" u="none" strike="noStrike" cap="none" spc="0">
+                <a:solidFill>
+                  <a:srgbClr val="FFFFFF">
+                    <a:alpha val="70000"/>
+                  </a:srgbClr>
+                </a:solidFill>
+                <a:latin typeface="+mn-lt"/>
+                <a:ea typeface="+mn-ea"/>
+                <a:cs typeface="+mn-cs"/>
               </a:rPr>
               <a:t>To reach the main goal, we need to implement some classification algorithms for supervised learning such as Support Vector Machine, K-Nearest Neighbours or Decision Tree Classification.</a:t>
             </a:r>
+            <a:endParaRPr sz="2800"/>
           </a:p>
         </p:txBody>
       </p:sp>
     </p:spTree>
-    <p:extLst>
-      <p:ext uri="{BB962C8B-B14F-4D97-AF65-F5344CB8AC3E}">
-        <p14:creationId xmlns:p14="http://schemas.microsoft.com/office/powerpoint/2010/main" val="434271405"/>
-      </p:ext>
-    </p:extLst>
   </p:cSld>
   <p:clrMapOvr>
     <a:masterClrMapping/>
   </p:clrMapOvr>
+  <mc:AlternateContent xmlns:mc="http://schemas.openxmlformats.org/markup-compatibility/2006">
+    <mc:Choice xmlns:p14="http://schemas.microsoft.com/office/powerpoint/2010/main" Requires="p14">
+      <p:transition p14:dur="2000" advClick="1"/>
+    </mc:Choice>
+    <mc:Fallback>
+      <p:transition advClick="1"/>
+    </mc:Fallback>
+  </mc:AlternateContent>
 </p:sld>
 </file>
 
 <file path=ppt/slides/slide5.xml><?xml version="1.0" encoding="utf-8"?>
-<p:sld xmlns:a="http://schemas.openxmlformats.org/drawingml/2006/main" xmlns:r="http://schemas.openxmlformats.org/officeDocument/2006/relationships" xmlns:p="http://schemas.openxmlformats.org/presentationml/2006/main">
-  <p:cSld>
+<p:sld xmlns:a="http://schemas.openxmlformats.org/drawingml/2006/main" xmlns:r="http://schemas.openxmlformats.org/officeDocument/2006/relationships" xmlns:p="http://schemas.openxmlformats.org/presentationml/2006/main" xmlns:m="http://schemas.openxmlformats.org/officeDocument/2006/math" xmlns:w="http://schemas.openxmlformats.org/wordprocessingml/2006/main" showMasterPhAnim="0" show="1">
+  <p:cSld name="">
     <p:spTree>
       <p:nvGrpSpPr>
-        <p:cNvPr id="1" name=""/>
+        <p:cNvPr id="1" name="" hidden="0"/>
         <p:cNvGrpSpPr/>
-        <p:nvPr/>
+        <p:nvPr isPhoto="0" userDrawn="0"/>
       </p:nvGrpSpPr>
-      <p:grpSpPr>
+      <p:grpSpPr bwMode="auto">
         <a:xfrm>
           <a:off x="0" y="0"/>
           <a:ext cx="0" cy="0"/>
@@ -4872,694 +5073,139 @@
       </p:grpSpPr>
       <p:sp>
         <p:nvSpPr>
-          <p:cNvPr id="2" name="Título 1">
-            <a:extLst>
-              <a:ext uri="{FF2B5EF4-FFF2-40B4-BE49-F238E27FC236}">
-                <a16:creationId xmlns:a16="http://schemas.microsoft.com/office/drawing/2014/main" id="{20CE746B-15ED-CAF1-4D2D-DCFE51D55F69}"/>
-              </a:ext>
-            </a:extLst>
-          </p:cNvPr>
-          <p:cNvSpPr>
-            <a:spLocks noGrp="1"/>
-          </p:cNvSpPr>
-          <p:nvPr>
-            <p:ph type="title"/>
-          </p:nvPr>
-        </p:nvSpPr>
-        <p:spPr/>
+          <p:cNvPr id="2" name="Título 1" hidden="0"/>
+          <p:cNvSpPr>
+            <a:spLocks noGrp="1"/>
+          </p:cNvSpPr>
+          <p:nvPr isPhoto="0" userDrawn="0">
+            <p:ph type="title" hasCustomPrompt="0"/>
+          </p:nvPr>
+        </p:nvSpPr>
+        <p:spPr bwMode="auto"/>
         <p:txBody>
           <a:bodyPr/>
           <a:lstStyle/>
           <a:p>
-            <a:r>
-              <a:rPr lang="pt-PT" dirty="0" err="1"/>
+            <a:pPr>
+              <a:defRPr/>
+            </a:pPr>
+            <a:r>
+              <a:rPr lang="pt-PT"/>
               <a:t>Work</a:t>
             </a:r>
             <a:r>
-              <a:rPr lang="pt-PT" dirty="0"/>
+              <a:rPr lang="pt-PT"/>
               <a:t> </a:t>
             </a:r>
             <a:r>
-              <a:rPr lang="pt-PT" dirty="0" err="1"/>
+              <a:rPr lang="pt-PT"/>
               <a:t>already</a:t>
             </a:r>
             <a:r>
-              <a:rPr lang="pt-PT" dirty="0"/>
+              <a:rPr lang="pt-PT"/>
               <a:t> </a:t>
             </a:r>
             <a:r>
-              <a:rPr lang="pt-PT" dirty="0" err="1"/>
+              <a:rPr lang="pt-PT"/>
               <a:t>done</a:t>
             </a:r>
-            <a:endParaRPr lang="pt-PT" dirty="0"/>
-          </a:p>
-        </p:txBody>
-      </p:sp>
-      <p:sp>
-        <p:nvSpPr>
-          <p:cNvPr id="3" name="Marcador de Posição de Conteúdo 2">
-            <a:extLst>
-              <a:ext uri="{FF2B5EF4-FFF2-40B4-BE49-F238E27FC236}">
-                <a16:creationId xmlns:a16="http://schemas.microsoft.com/office/drawing/2014/main" id="{3BE73127-E3F0-EFC7-D7D9-EBDB0DEE9F41}"/>
-              </a:ext>
-            </a:extLst>
-          </p:cNvPr>
-          <p:cNvSpPr>
-            <a:spLocks noGrp="1"/>
-          </p:cNvSpPr>
-          <p:nvPr>
-            <p:ph idx="1"/>
-          </p:nvPr>
-        </p:nvSpPr>
-        <p:spPr/>
-        <p:txBody>
-          <a:bodyPr vert="horz" lIns="91440" tIns="45720" rIns="91440" bIns="45720" rtlCol="0" anchor="t">
-            <a:normAutofit fontScale="85000" lnSpcReduction="10000"/>
+            <a:endParaRPr lang="pt-PT"/>
+          </a:p>
+        </p:txBody>
+      </p:sp>
+      <p:sp>
+        <p:nvSpPr>
+          <p:cNvPr id="3" name="Marcador de Posição de Conteúdo 2" hidden="0"/>
+          <p:cNvSpPr>
+            <a:spLocks noGrp="1"/>
+          </p:cNvSpPr>
+          <p:nvPr isPhoto="0" userDrawn="0">
+            <p:ph idx="1" hasCustomPrompt="0"/>
+          </p:nvPr>
+        </p:nvSpPr>
+        <p:spPr bwMode="auto"/>
+        <p:txBody>
+          <a:bodyPr vertOverflow="overflow" horzOverflow="clip" vert="horz" wrap="square" lIns="91440" tIns="45720" rIns="91440" bIns="45720" numCol="1" spcCol="0" rtlCol="0" fromWordArt="0" anchor="t" anchorCtr="0" forceAA="0" upright="0" compatLnSpc="0">
+            <a:normAutofit fontScale="85000" lnSpcReduction="3000"/>
           </a:bodyPr>
           <a:lstStyle/>
           <a:p>
-            <a:r>
-              <a:rPr lang="pt-PT" sz="2800" b="1" dirty="0" err="1">
+            <a:pPr>
+              <a:defRPr/>
+            </a:pPr>
+            <a:r>
+              <a:rPr lang="pt-PT" sz="2800" b="1">
                 <a:latin typeface="Avenir Next LT Pro (corpo)"/>
-                <a:ea typeface="Roboto" pitchFamily="2" charset="0"/>
+                <a:ea typeface="Roboto"/>
               </a:rPr>
-              <a:t>Programming</a:t>
-            </a:r>
-            <a:r>
-              <a:rPr lang="pt-PT" sz="2800" b="1" dirty="0">
+              <a:t>Data Pre-Processing</a:t>
+            </a:r>
+            <a:r>
+              <a:rPr lang="pt-PT" sz="2800">
                 <a:latin typeface="Avenir Next LT Pro (corpo)"/>
-                <a:ea typeface="Roboto" pitchFamily="2" charset="0"/>
-              </a:rPr>
-              <a:t> </a:t>
-            </a:r>
-            <a:r>
-              <a:rPr lang="pt-PT" sz="2800" b="1" dirty="0" err="1">
-                <a:latin typeface="Avenir Next LT Pro (corpo)"/>
-                <a:ea typeface="Roboto" pitchFamily="2" charset="0"/>
-              </a:rPr>
-              <a:t>language</a:t>
-            </a:r>
-            <a:r>
-              <a:rPr lang="pt-PT" sz="2800" dirty="0">
-                <a:latin typeface="Avenir Next LT Pro (corpo)"/>
-                <a:ea typeface="Roboto" pitchFamily="2" charset="0"/>
+                <a:ea typeface="Roboto"/>
               </a:rPr>
               <a:t>: </a:t>
             </a:r>
             <a:r>
-              <a:rPr lang="pt-PT" sz="2800" dirty="0" err="1">
+              <a:rPr lang="pt-PT" sz="2800">
                 <a:latin typeface="Avenir Next LT Pro (corpo)"/>
-                <a:ea typeface="Roboto" pitchFamily="2" charset="0"/>
-                <a:hlinkClick r:id="rId2"/>
+                <a:ea typeface="Roboto"/>
               </a:rPr>
-              <a:t>Python</a:t>
-            </a:r>
-            <a:r>
-              <a:rPr lang="pt-PT" sz="2800" dirty="0">
+              <a:t>for this part we have already done a simple explanation of what each column represents as weel as loading all the </a:t>
+            </a:r>
+            <a:r>
+              <a:rPr lang="pt-PT" sz="2800">
                 <a:latin typeface="Avenir Next LT Pro (corpo)"/>
-                <a:ea typeface="Roboto" pitchFamily="2" charset="0"/>
+                <a:ea typeface="Roboto"/>
               </a:rPr>
-              <a:t>, </a:t>
-            </a:r>
-            <a:r>
-              <a:rPr lang="pt-PT" sz="2800" dirty="0" err="1">
+              <a:t>data. After that we verify the existance of any missing values (no null values were found) or repeated values (only the customerId must be unique) and remove unnecessary columns for our analysis (customerId will have no impact for the data study).</a:t>
+            </a:r>
+            <a:r>
+              <a:rPr lang="pt-PT" sz="2800">
                 <a:latin typeface="Avenir Next LT Pro (corpo)"/>
-                <a:ea typeface="Roboto" pitchFamily="2" charset="0"/>
-                <a:hlinkClick r:id="rId3"/>
+                <a:ea typeface="Roboto"/>
               </a:rPr>
-              <a:t>OpenAI</a:t>
-            </a:r>
-            <a:r>
-              <a:rPr lang="pt-PT" sz="2800" dirty="0">
+              <a:t>  </a:t>
+            </a:r>
+            <a:endParaRPr lang="pt-PT" sz="2800">
+              <a:latin typeface="Avenir Next LT Pro (corpo)"/>
+              <a:ea typeface="Roboto"/>
+            </a:endParaRPr>
+          </a:p>
+          <a:p>
+            <a:pPr algn="l">
+              <a:buFont typeface="Arial"/>
+              <a:buChar char="•"/>
+              <a:defRPr/>
+            </a:pPr>
+            <a:r>
+              <a:rPr lang="pt-PT" sz="2800" b="1" i="0" u="none" strike="noStrike" cap="none" spc="0">
+                <a:solidFill>
+                  <a:schemeClr val="tx1">
+                    <a:alpha val="70000"/>
+                  </a:schemeClr>
+                </a:solidFill>
                 <a:latin typeface="Avenir Next LT Pro (corpo)"/>
-                <a:ea typeface="Roboto" pitchFamily="2" charset="0"/>
+                <a:ea typeface="Roboto"/>
+                <a:cs typeface="Avenir Next LT Pro (corpo)"/>
               </a:rPr>
-              <a:t>, </a:t>
-            </a:r>
-            <a:r>
-              <a:rPr lang="pt-PT" sz="2800" dirty="0" err="1">
+              <a:t>Data Visualization</a:t>
+            </a:r>
+            <a:r>
+              <a:rPr lang="pt-PT" sz="2800" b="0" i="0" u="none" strike="noStrike" cap="none" spc="0">
+                <a:solidFill>
+                  <a:schemeClr val="tx1">
+                    <a:alpha val="70000"/>
+                  </a:schemeClr>
+                </a:solidFill>
                 <a:latin typeface="Avenir Next LT Pro (corpo)"/>
-                <a:ea typeface="Roboto" pitchFamily="2" charset="0"/>
-                <a:hlinkClick r:id="rId4"/>
+                <a:ea typeface="Roboto"/>
+                <a:cs typeface="Avenir Next LT Pro (corpo)"/>
               </a:rPr>
-              <a:t>Jupyter</a:t>
-            </a:r>
-            <a:r>
-              <a:rPr lang="pt-PT" sz="2800" dirty="0">
-                <a:latin typeface="Avenir Next LT Pro (corpo)"/>
-                <a:ea typeface="Roboto" pitchFamily="2" charset="0"/>
-                <a:hlinkClick r:id="rId4"/>
-              </a:rPr>
-              <a:t> Notebook</a:t>
-            </a:r>
-            <a:r>
-              <a:rPr lang="pt-PT" sz="2800" dirty="0">
-                <a:latin typeface="Avenir Next LT Pro (corpo)"/>
-                <a:ea typeface="Roboto" pitchFamily="2" charset="0"/>
-              </a:rPr>
-              <a:t> (</a:t>
-            </a:r>
-            <a:r>
-              <a:rPr lang="pt-PT" sz="2800" dirty="0" err="1">
-                <a:latin typeface="Avenir Next LT Pro (corpo)"/>
-                <a:ea typeface="Roboto" pitchFamily="2" charset="0"/>
-              </a:rPr>
-              <a:t>with</a:t>
-            </a:r>
-            <a:r>
-              <a:rPr lang="pt-PT" sz="2800" dirty="0">
-                <a:latin typeface="Avenir Next LT Pro (corpo)"/>
-                <a:ea typeface="Roboto" pitchFamily="2" charset="0"/>
-              </a:rPr>
-              <a:t> </a:t>
-            </a:r>
-            <a:r>
-              <a:rPr lang="pt-PT" sz="2800" dirty="0">
-                <a:latin typeface="Avenir Next LT Pro (corpo)"/>
-                <a:ea typeface="Roboto" pitchFamily="2" charset="0"/>
-                <a:hlinkClick r:id="rId5"/>
-              </a:rPr>
-              <a:t>Anaconda</a:t>
-            </a:r>
-            <a:r>
-              <a:rPr lang="pt-PT" sz="2800" dirty="0">
-                <a:latin typeface="Avenir Next LT Pro (corpo)"/>
-                <a:ea typeface="Roboto" pitchFamily="2" charset="0"/>
-              </a:rPr>
-              <a:t>)</a:t>
-            </a:r>
-            <a:endParaRPr lang="pt-PT" sz="2800" b="1" dirty="0">
-              <a:latin typeface="Avenir Next LT Pro (corpo)"/>
-              <a:ea typeface="Roboto" pitchFamily="2" charset="0"/>
-            </a:endParaRPr>
-          </a:p>
-          <a:p>
-            <a:r>
-              <a:rPr lang="pt-PT" sz="2800" b="1" dirty="0" err="1">
-                <a:latin typeface="Avenir Next LT Pro (corpo)"/>
-                <a:ea typeface="Roboto" pitchFamily="2" charset="0"/>
-              </a:rPr>
-              <a:t>Development</a:t>
-            </a:r>
-            <a:r>
-              <a:rPr lang="pt-PT" sz="2800" b="1" dirty="0">
-                <a:latin typeface="Avenir Next LT Pro (corpo)"/>
-                <a:ea typeface="Roboto" pitchFamily="2" charset="0"/>
-              </a:rPr>
-              <a:t> </a:t>
-            </a:r>
-            <a:r>
-              <a:rPr lang="pt-PT" sz="2800" b="1" dirty="0" err="1">
-                <a:latin typeface="Avenir Next LT Pro (corpo)"/>
-                <a:ea typeface="Roboto" pitchFamily="2" charset="0"/>
-              </a:rPr>
-              <a:t>environment</a:t>
-            </a:r>
-            <a:r>
-              <a:rPr lang="pt-PT" sz="2800" dirty="0">
-                <a:latin typeface="Avenir Next LT Pro (corpo)"/>
-                <a:ea typeface="Roboto" pitchFamily="2" charset="0"/>
-              </a:rPr>
-              <a:t>: </a:t>
-            </a:r>
-            <a:r>
-              <a:rPr lang="pt-PT" sz="2800" dirty="0" err="1">
-                <a:latin typeface="Avenir Next LT Pro (corpo)"/>
-                <a:ea typeface="Roboto" pitchFamily="2" charset="0"/>
-              </a:rPr>
-              <a:t>VSCode</a:t>
-            </a:r>
-            <a:r>
-              <a:rPr lang="pt-PT" sz="2800" dirty="0">
-                <a:latin typeface="Avenir Next LT Pro (corpo)"/>
-                <a:ea typeface="Roboto" pitchFamily="2" charset="0"/>
-              </a:rPr>
-              <a:t>, </a:t>
-            </a:r>
-            <a:r>
-              <a:rPr lang="pt-PT" sz="2800" dirty="0" err="1">
-                <a:latin typeface="Avenir Next LT Pro (corpo)"/>
-                <a:ea typeface="Roboto" pitchFamily="2" charset="0"/>
-              </a:rPr>
-              <a:t>IntelliJ</a:t>
-            </a:r>
-            <a:r>
-              <a:rPr lang="pt-PT" sz="2800" dirty="0">
-                <a:latin typeface="Avenir Next LT Pro (corpo)"/>
-                <a:ea typeface="Roboto" pitchFamily="2" charset="0"/>
-              </a:rPr>
-              <a:t>, </a:t>
-            </a:r>
-            <a:r>
-              <a:rPr lang="pt-PT" sz="2800" dirty="0" err="1">
-                <a:latin typeface="Avenir Next LT Pro (corpo)"/>
-                <a:ea typeface="Roboto" pitchFamily="2" charset="0"/>
-              </a:rPr>
-              <a:t>Pycharm</a:t>
-            </a:r>
-            <a:endParaRPr lang="pt-PT" sz="2800" dirty="0">
-              <a:latin typeface="Avenir Next LT Pro (corpo)"/>
-              <a:ea typeface="Roboto" pitchFamily="2" charset="0"/>
-            </a:endParaRPr>
-          </a:p>
-          <a:p>
-            <a:r>
-              <a:rPr lang="pt-PT" sz="2800" b="1" dirty="0">
-                <a:latin typeface="Avenir Next LT Pro (corpo)"/>
-                <a:ea typeface="Roboto" pitchFamily="2" charset="0"/>
-              </a:rPr>
-              <a:t>Data </a:t>
-            </a:r>
-            <a:r>
-              <a:rPr lang="pt-PT" sz="2800" b="1" dirty="0" err="1">
-                <a:latin typeface="Avenir Next LT Pro (corpo)"/>
-                <a:ea typeface="Roboto" pitchFamily="2" charset="0"/>
-              </a:rPr>
-              <a:t>Structures</a:t>
-            </a:r>
-            <a:r>
-              <a:rPr lang="pt-PT" sz="2800" dirty="0">
-                <a:latin typeface="Avenir Next LT Pro (corpo)"/>
-                <a:ea typeface="Roboto" pitchFamily="2" charset="0"/>
-              </a:rPr>
-              <a:t>:</a:t>
-            </a:r>
-            <a:r>
-              <a:rPr lang="pt-PT" dirty="0">
-                <a:latin typeface="Avenir Next LT Pro (corpo)"/>
-                <a:ea typeface="Roboto" pitchFamily="2" charset="0"/>
-              </a:rPr>
-              <a:t> </a:t>
-            </a:r>
-            <a:r>
-              <a:rPr lang="pt-PT" sz="2800" dirty="0" err="1">
-                <a:latin typeface="Avenir Next LT Pro (corpo)"/>
-                <a:ea typeface="Roboto" pitchFamily="2" charset="0"/>
-              </a:rPr>
-              <a:t>We</a:t>
-            </a:r>
-            <a:r>
-              <a:rPr lang="pt-PT" sz="2800" dirty="0">
-                <a:latin typeface="Avenir Next LT Pro (corpo)"/>
-                <a:ea typeface="Roboto" pitchFamily="2" charset="0"/>
-              </a:rPr>
-              <a:t> </a:t>
-            </a:r>
-            <a:r>
-              <a:rPr lang="pt-PT" sz="2800" dirty="0" err="1">
-                <a:latin typeface="Avenir Next LT Pro (corpo)"/>
-                <a:ea typeface="Roboto" pitchFamily="2" charset="0"/>
-              </a:rPr>
-              <a:t>used</a:t>
-            </a:r>
-            <a:r>
-              <a:rPr lang="pt-PT" sz="2800" dirty="0">
-                <a:latin typeface="Avenir Next LT Pro (corpo)"/>
-                <a:ea typeface="Roboto" pitchFamily="2" charset="0"/>
-              </a:rPr>
-              <a:t> </a:t>
-            </a:r>
-            <a:r>
-              <a:rPr lang="pt-PT" sz="2800" dirty="0" err="1">
-                <a:latin typeface="Avenir Next LT Pro (corpo)"/>
-                <a:ea typeface="Roboto" pitchFamily="2" charset="0"/>
-              </a:rPr>
-              <a:t>our</a:t>
-            </a:r>
-            <a:r>
-              <a:rPr lang="pt-PT" sz="2800" dirty="0">
-                <a:latin typeface="Avenir Next LT Pro (corpo)"/>
-                <a:ea typeface="Roboto" pitchFamily="2" charset="0"/>
-              </a:rPr>
-              <a:t> </a:t>
-            </a:r>
-            <a:r>
-              <a:rPr lang="pt-PT" sz="2800" dirty="0" err="1">
-                <a:latin typeface="Avenir Next LT Pro (corpo)"/>
-                <a:ea typeface="Roboto" pitchFamily="2" charset="0"/>
-              </a:rPr>
-              <a:t>imports</a:t>
-            </a:r>
-            <a:r>
-              <a:rPr lang="pt-PT" sz="2800" dirty="0">
-                <a:latin typeface="Avenir Next LT Pro (corpo)"/>
-                <a:ea typeface="Roboto" pitchFamily="2" charset="0"/>
-              </a:rPr>
-              <a:t> to </a:t>
-            </a:r>
-            <a:r>
-              <a:rPr lang="pt-PT" sz="2800" dirty="0" err="1">
-                <a:latin typeface="Avenir Next LT Pro (corpo)"/>
-                <a:ea typeface="Roboto" pitchFamily="2" charset="0"/>
-              </a:rPr>
-              <a:t>manage</a:t>
-            </a:r>
-            <a:r>
-              <a:rPr lang="pt-PT" dirty="0">
-                <a:latin typeface="Avenir Next LT Pro (corpo)"/>
-                <a:ea typeface="Roboto" pitchFamily="2" charset="0"/>
-              </a:rPr>
-              <a:t>, </a:t>
-            </a:r>
-            <a:r>
-              <a:rPr lang="pt-PT" dirty="0" err="1">
-                <a:latin typeface="Avenir Next LT Pro (corpo)"/>
-                <a:ea typeface="Roboto" pitchFamily="2" charset="0"/>
-              </a:rPr>
-              <a:t>access</a:t>
-            </a:r>
-            <a:r>
-              <a:rPr lang="pt-PT" dirty="0">
-                <a:latin typeface="Avenir Next LT Pro (corpo)"/>
-                <a:ea typeface="Roboto" pitchFamily="2" charset="0"/>
-              </a:rPr>
-              <a:t> </a:t>
-            </a:r>
-            <a:r>
-              <a:rPr lang="pt-PT" dirty="0" err="1">
-                <a:latin typeface="Avenir Next LT Pro (corpo)"/>
-                <a:ea typeface="Roboto" pitchFamily="2" charset="0"/>
-              </a:rPr>
-              <a:t>and</a:t>
-            </a:r>
-            <a:r>
-              <a:rPr lang="pt-PT" dirty="0">
-                <a:latin typeface="Avenir Next LT Pro (corpo)"/>
-                <a:ea typeface="Roboto" pitchFamily="2" charset="0"/>
-              </a:rPr>
-              <a:t> </a:t>
-            </a:r>
-            <a:r>
-              <a:rPr lang="pt-PT" dirty="0" err="1">
-                <a:latin typeface="Avenir Next LT Pro (corpo)"/>
-                <a:ea typeface="Roboto" pitchFamily="2" charset="0"/>
-              </a:rPr>
-              <a:t>store</a:t>
-            </a:r>
-            <a:r>
-              <a:rPr lang="pt-PT">
-                <a:latin typeface="Avenir Next LT Pro (corpo)"/>
-                <a:ea typeface="Roboto" pitchFamily="2" charset="0"/>
-              </a:rPr>
-              <a:t> data</a:t>
-            </a:r>
-            <a:endParaRPr lang="pt-PT" sz="2800" dirty="0">
-              <a:latin typeface="Avenir Next LT Pro (corpo)"/>
-              <a:ea typeface="Roboto" pitchFamily="2" charset="0"/>
-            </a:endParaRPr>
-          </a:p>
-          <a:p>
-            <a:r>
-              <a:rPr lang="pt-PT" sz="2800" b="1" dirty="0">
-                <a:latin typeface="Avenir Next LT Pro (corpo)"/>
-                <a:ea typeface="Roboto" pitchFamily="2" charset="0"/>
-              </a:rPr>
-              <a:t>File </a:t>
-            </a:r>
-            <a:r>
-              <a:rPr lang="pt-PT" sz="2800" b="1" dirty="0" err="1">
-                <a:latin typeface="Avenir Next LT Pro (corpo)"/>
-                <a:ea typeface="Roboto" pitchFamily="2" charset="0"/>
-              </a:rPr>
-              <a:t>Structure</a:t>
-            </a:r>
-            <a:r>
-              <a:rPr lang="pt-PT" sz="2800" dirty="0">
-                <a:latin typeface="Avenir Next LT Pro (corpo)"/>
-                <a:ea typeface="Roboto" pitchFamily="2" charset="0"/>
-              </a:rPr>
-              <a:t>: </a:t>
-            </a:r>
-            <a:r>
-              <a:rPr lang="pt-PT" sz="2800" dirty="0" err="1">
-                <a:latin typeface="Avenir Next LT Pro (corpo)"/>
-                <a:ea typeface="Roboto" pitchFamily="2" charset="0"/>
-              </a:rPr>
-              <a:t>The</a:t>
-            </a:r>
-            <a:r>
-              <a:rPr lang="pt-PT" sz="2800" dirty="0">
-                <a:latin typeface="Avenir Next LT Pro (corpo)"/>
-                <a:ea typeface="Roboto" pitchFamily="2" charset="0"/>
-              </a:rPr>
-              <a:t> </a:t>
-            </a:r>
-            <a:r>
-              <a:rPr lang="pt-PT" sz="2800" dirty="0" err="1">
-                <a:latin typeface="Avenir Next LT Pro (corpo)"/>
-                <a:ea typeface="Roboto" pitchFamily="2" charset="0"/>
-              </a:rPr>
-              <a:t>Project’s</a:t>
-            </a:r>
-            <a:r>
-              <a:rPr lang="pt-PT" sz="2800" dirty="0">
-                <a:latin typeface="Avenir Next LT Pro (corpo)"/>
-                <a:ea typeface="Roboto" pitchFamily="2" charset="0"/>
-              </a:rPr>
-              <a:t> </a:t>
-            </a:r>
-            <a:r>
-              <a:rPr lang="pt-PT" sz="2800" dirty="0" err="1">
-                <a:latin typeface="Avenir Next LT Pro (corpo)"/>
-                <a:ea typeface="Roboto" pitchFamily="2" charset="0"/>
-              </a:rPr>
-              <a:t>Repository</a:t>
-            </a:r>
-            <a:r>
-              <a:rPr lang="pt-PT" sz="2800" dirty="0">
-                <a:latin typeface="Avenir Next LT Pro (corpo)"/>
-                <a:ea typeface="Roboto" pitchFamily="2" charset="0"/>
-              </a:rPr>
-              <a:t> </a:t>
-            </a:r>
-            <a:r>
-              <a:rPr lang="pt-PT" sz="2800" dirty="0" err="1">
-                <a:latin typeface="Avenir Next LT Pro (corpo)"/>
-                <a:ea typeface="Roboto" pitchFamily="2" charset="0"/>
-              </a:rPr>
-              <a:t>is</a:t>
-            </a:r>
-            <a:r>
-              <a:rPr lang="pt-PT" sz="2800" dirty="0">
-                <a:latin typeface="Avenir Next LT Pro (corpo)"/>
-                <a:ea typeface="Roboto" pitchFamily="2" charset="0"/>
-              </a:rPr>
-              <a:t> </a:t>
-            </a:r>
-            <a:r>
-              <a:rPr lang="pt-PT" sz="2800" dirty="0" err="1">
-                <a:latin typeface="Avenir Next LT Pro (corpo)"/>
-                <a:ea typeface="Roboto" pitchFamily="2" charset="0"/>
-              </a:rPr>
-              <a:t>available</a:t>
-            </a:r>
-            <a:r>
-              <a:rPr lang="pt-PT" sz="2800" dirty="0">
-                <a:latin typeface="Avenir Next LT Pro (corpo)"/>
-                <a:ea typeface="Roboto" pitchFamily="2" charset="0"/>
-              </a:rPr>
-              <a:t> </a:t>
-            </a:r>
-            <a:r>
-              <a:rPr lang="pt-PT" sz="2800" dirty="0" err="1">
-                <a:latin typeface="Avenir Next LT Pro (corpo)"/>
-                <a:ea typeface="Roboto" pitchFamily="2" charset="0"/>
-              </a:rPr>
-              <a:t>at</a:t>
-            </a:r>
-            <a:r>
-              <a:rPr lang="pt-PT" sz="2800" dirty="0">
-                <a:latin typeface="Avenir Next LT Pro (corpo)"/>
-                <a:ea typeface="Roboto" pitchFamily="2" charset="0"/>
-              </a:rPr>
-              <a:t> </a:t>
-            </a:r>
-            <a:r>
-              <a:rPr lang="pt-PT" sz="2800" dirty="0" err="1">
-                <a:latin typeface="Avenir Next LT Pro (corpo)"/>
-                <a:ea typeface="Roboto" pitchFamily="2" charset="0"/>
-                <a:hlinkClick r:id="rId6"/>
-              </a:rPr>
-              <a:t>Github</a:t>
-            </a:r>
-            <a:endParaRPr lang="pt-PT" sz="2800" dirty="0">
-              <a:latin typeface="Avenir Next LT Pro (corpo)"/>
-              <a:ea typeface="Roboto" pitchFamily="2" charset="0"/>
-            </a:endParaRPr>
-          </a:p>
-          <a:p>
-            <a:r>
-              <a:rPr lang="pt-PT" sz="2800" b="1" dirty="0" err="1">
-                <a:latin typeface="Avenir Next LT Pro (corpo)"/>
-                <a:ea typeface="Roboto" pitchFamily="2" charset="0"/>
-              </a:rPr>
-              <a:t>Implemented</a:t>
-            </a:r>
-            <a:r>
-              <a:rPr lang="pt-PT" sz="2800" b="1" dirty="0">
-                <a:latin typeface="Avenir Next LT Pro (corpo)"/>
-                <a:ea typeface="Roboto" pitchFamily="2" charset="0"/>
-              </a:rPr>
-              <a:t> </a:t>
-            </a:r>
-            <a:r>
-              <a:rPr lang="pt-PT" sz="2800" b="1" dirty="0" err="1">
-                <a:latin typeface="Avenir Next LT Pro (corpo)"/>
-                <a:ea typeface="Roboto" pitchFamily="2" charset="0"/>
-              </a:rPr>
-              <a:t>Work</a:t>
-            </a:r>
-            <a:r>
-              <a:rPr lang="pt-PT" sz="2800" dirty="0">
-                <a:latin typeface="Avenir Next LT Pro (corpo)"/>
-                <a:ea typeface="Roboto" pitchFamily="2" charset="0"/>
-              </a:rPr>
-              <a:t>: </a:t>
-            </a:r>
-            <a:r>
-              <a:rPr lang="pt-PT" dirty="0">
-                <a:latin typeface="Avenir Next LT Pro (corpo)"/>
-                <a:ea typeface="Roboto" pitchFamily="2" charset="0"/>
-              </a:rPr>
-              <a:t>Data </a:t>
-            </a:r>
-            <a:r>
-              <a:rPr lang="pt-PT" dirty="0" err="1">
-                <a:latin typeface="Avenir Next LT Pro (corpo)"/>
-                <a:ea typeface="Roboto" pitchFamily="2" charset="0"/>
-              </a:rPr>
-              <a:t>Pre-Processing</a:t>
-            </a:r>
-            <a:r>
-              <a:rPr lang="pt-PT" dirty="0">
-                <a:latin typeface="Avenir Next LT Pro (corpo)"/>
-                <a:ea typeface="Roboto" pitchFamily="2" charset="0"/>
-              </a:rPr>
-              <a:t>, data </a:t>
-            </a:r>
-            <a:r>
-              <a:rPr lang="pt-PT" dirty="0" err="1">
-                <a:latin typeface="Avenir Next LT Pro (corpo)"/>
-                <a:ea typeface="Roboto" pitchFamily="2" charset="0"/>
-              </a:rPr>
-              <a:t>graphics</a:t>
-            </a:r>
-            <a:r>
-              <a:rPr lang="pt-PT" dirty="0">
-                <a:latin typeface="Avenir Next LT Pro (corpo)"/>
-                <a:ea typeface="Roboto" pitchFamily="2" charset="0"/>
-              </a:rPr>
-              <a:t>, </a:t>
-            </a:r>
-            <a:r>
-              <a:rPr lang="pt-PT" dirty="0" err="1">
-                <a:latin typeface="Avenir Next LT Pro (corpo)"/>
-                <a:ea typeface="Roboto" pitchFamily="2" charset="0"/>
-              </a:rPr>
-              <a:t>repeated</a:t>
-            </a:r>
-            <a:r>
-              <a:rPr lang="pt-PT" dirty="0">
-                <a:latin typeface="Avenir Next LT Pro (corpo)"/>
-                <a:ea typeface="Roboto" pitchFamily="2" charset="0"/>
-              </a:rPr>
-              <a:t> </a:t>
-            </a:r>
-            <a:r>
-              <a:rPr lang="pt-PT" dirty="0" err="1">
-                <a:latin typeface="Avenir Next LT Pro (corpo)"/>
-                <a:ea typeface="Roboto" pitchFamily="2" charset="0"/>
-              </a:rPr>
-              <a:t>values</a:t>
-            </a:r>
-            <a:r>
-              <a:rPr lang="pt-PT" dirty="0">
-                <a:latin typeface="Avenir Next LT Pro (corpo)"/>
-                <a:ea typeface="Roboto" pitchFamily="2" charset="0"/>
-              </a:rPr>
-              <a:t>, </a:t>
-            </a:r>
-            <a:r>
-              <a:rPr lang="pt-PT" dirty="0" err="1">
-                <a:latin typeface="Avenir Next LT Pro (corpo)"/>
-                <a:ea typeface="Roboto" pitchFamily="2" charset="0"/>
-              </a:rPr>
-              <a:t>null</a:t>
-            </a:r>
-            <a:r>
-              <a:rPr lang="pt-PT" dirty="0">
-                <a:latin typeface="Avenir Next LT Pro (corpo)"/>
-                <a:ea typeface="Roboto" pitchFamily="2" charset="0"/>
-              </a:rPr>
-              <a:t> </a:t>
-            </a:r>
-            <a:r>
-              <a:rPr lang="pt-PT" dirty="0" err="1">
-                <a:latin typeface="Avenir Next LT Pro (corpo)"/>
-                <a:ea typeface="Roboto" pitchFamily="2" charset="0"/>
-              </a:rPr>
-              <a:t>values</a:t>
-            </a:r>
-            <a:r>
-              <a:rPr lang="pt-PT" dirty="0">
-                <a:latin typeface="Avenir Next LT Pro (corpo)"/>
-                <a:ea typeface="Roboto" pitchFamily="2" charset="0"/>
-              </a:rPr>
-              <a:t> </a:t>
-            </a:r>
-            <a:r>
-              <a:rPr lang="pt-PT" dirty="0" err="1">
-                <a:latin typeface="Avenir Next LT Pro (corpo)"/>
-                <a:ea typeface="Roboto" pitchFamily="2" charset="0"/>
-              </a:rPr>
-              <a:t>and</a:t>
-            </a:r>
-            <a:r>
-              <a:rPr lang="pt-PT" dirty="0">
-                <a:latin typeface="Avenir Next LT Pro (corpo)"/>
-                <a:ea typeface="Roboto" pitchFamily="2" charset="0"/>
-              </a:rPr>
-              <a:t> </a:t>
-            </a:r>
-            <a:r>
-              <a:rPr lang="pt-PT" dirty="0" err="1">
-                <a:latin typeface="Avenir Next LT Pro (corpo)"/>
-                <a:ea typeface="Roboto" pitchFamily="2" charset="0"/>
-              </a:rPr>
-              <a:t>unnecessary</a:t>
-            </a:r>
-            <a:r>
-              <a:rPr lang="pt-PT" dirty="0">
-                <a:latin typeface="Avenir Next LT Pro (corpo)"/>
-                <a:ea typeface="Roboto" pitchFamily="2" charset="0"/>
-              </a:rPr>
-              <a:t> </a:t>
-            </a:r>
-            <a:r>
-              <a:rPr lang="pt-PT" dirty="0" err="1">
-                <a:latin typeface="Avenir Next LT Pro (corpo)"/>
-                <a:ea typeface="Roboto" pitchFamily="2" charset="0"/>
-              </a:rPr>
-              <a:t>columns</a:t>
-            </a:r>
-            <a:r>
-              <a:rPr lang="pt-PT" dirty="0">
-                <a:latin typeface="Avenir Next LT Pro (corpo)"/>
-                <a:ea typeface="Roboto" pitchFamily="2" charset="0"/>
-              </a:rPr>
-              <a:t>;</a:t>
-            </a:r>
-            <a:endParaRPr lang="pt-PT" sz="2800" dirty="0">
-              <a:latin typeface="Avenir Next LT Pro (corpo)"/>
-              <a:ea typeface="Roboto" pitchFamily="2" charset="0"/>
-            </a:endParaRPr>
-          </a:p>
-          <a:p>
-            <a:pPr algn="l">
-              <a:buFont typeface="Arial" panose="020B0604020202020204" pitchFamily="34" charset="0"/>
-              <a:buChar char="•"/>
-            </a:pPr>
-            <a:endParaRPr lang="pt-PT" dirty="0">
+              <a:t>: we made a simple bar plot to compare the churn and an histogram to verify any relation between tenure, gender and churn.</a:t>
+            </a:r>
+            <a:endParaRPr lang="pt-PT">
               <a:solidFill>
                 <a:srgbClr val="FFFFFF">
                   <a:alpha val="70000"/>
@@ -5571,20 +5217,23 @@
         </p:txBody>
       </p:sp>
     </p:spTree>
-    <p:extLst>
-      <p:ext uri="{BB962C8B-B14F-4D97-AF65-F5344CB8AC3E}">
-        <p14:creationId xmlns:p14="http://schemas.microsoft.com/office/powerpoint/2010/main" val="4042985322"/>
-      </p:ext>
-    </p:extLst>
   </p:cSld>
   <p:clrMapOvr>
     <a:masterClrMapping/>
   </p:clrMapOvr>
+  <mc:AlternateContent xmlns:mc="http://schemas.openxmlformats.org/markup-compatibility/2006">
+    <mc:Choice xmlns:p14="http://schemas.microsoft.com/office/powerpoint/2010/main" Requires="p14">
+      <p:transition p14:dur="2000" advClick="1"/>
+    </mc:Choice>
+    <mc:Fallback>
+      <p:transition advClick="1"/>
+    </mc:Fallback>
+  </mc:AlternateContent>
 </p:sld>
 </file>
 
 <file path=ppt/theme/theme1.xml><?xml version="1.0" encoding="utf-8"?>
-<a:theme xmlns:a="http://schemas.openxmlformats.org/drawingml/2006/main" name="PebbleVTI">
+<a:theme xmlns:a="http://schemas.openxmlformats.org/drawingml/2006/main" xmlns:r="http://schemas.openxmlformats.org/officeDocument/2006/relationships" xmlns:p="http://schemas.openxmlformats.org/presentationml/2006/main" name="PebbleVTI">
   <a:themeElements>
     <a:clrScheme name="Blush 3">
       <a:dk1>
@@ -5787,6 +5436,5 @@
     </a:fmtScheme>
   </a:themeElements>
   <a:objectDefaults/>
-  <a:extraClrSchemeLst/>
 </a:theme>
 </file>
</xml_diff>